<commit_message>
fixing slides for les08
</commit_message>
<xml_diff>
--- a/doc/advanced/slides/lesson_08.pptx
+++ b/doc/advanced/slides/lesson_08.pptx
@@ -6,7 +6,7 @@
     <p:sldMasterId id="2147483660" r:id="rId2"/>
   </p:sldMasterIdLst>
   <p:notesMasterIdLst>
-    <p:notesMasterId r:id="rId53"/>
+    <p:notesMasterId r:id="rId66"/>
   </p:notesMasterIdLst>
   <p:sldIdLst>
     <p:sldId id="307" r:id="rId3"/>
@@ -57,8 +57,21 @@
     <p:sldId id="302" r:id="rId48"/>
     <p:sldId id="316" r:id="rId49"/>
     <p:sldId id="319" r:id="rId50"/>
-    <p:sldId id="304" r:id="rId51"/>
-    <p:sldId id="313" r:id="rId52"/>
+    <p:sldId id="322" r:id="rId51"/>
+    <p:sldId id="338" r:id="rId52"/>
+    <p:sldId id="339" r:id="rId53"/>
+    <p:sldId id="340" r:id="rId54"/>
+    <p:sldId id="342" r:id="rId55"/>
+    <p:sldId id="345" r:id="rId56"/>
+    <p:sldId id="424" r:id="rId57"/>
+    <p:sldId id="430" r:id="rId58"/>
+    <p:sldId id="431" r:id="rId59"/>
+    <p:sldId id="323" r:id="rId60"/>
+    <p:sldId id="326" r:id="rId61"/>
+    <p:sldId id="325" r:id="rId62"/>
+    <p:sldId id="432" r:id="rId63"/>
+    <p:sldId id="304" r:id="rId64"/>
+    <p:sldId id="313" r:id="rId65"/>
   </p:sldIdLst>
   <p:sldSz cx="12192000" cy="6858000"/>
   <p:notesSz cx="6858000" cy="9144000"/>
@@ -247,7 +260,7 @@
           <a:p>
             <a:fld id="{060F4727-23A3-441E-BA41-9534DD80814F}" type="datetimeFigureOut">
               <a:rPr lang="en-US" smtClean="0"/>
-              <a:t>8/4/19</a:t>
+              <a:t>10/6/19</a:t>
             </a:fld>
             <a:endParaRPr lang="en-US"/>
           </a:p>
@@ -626,7 +639,7 @@
                 <a:tabLst/>
                 <a:defRPr/>
               </a:pPr>
-              <a:t>50</a:t>
+              <a:t>63</a:t>
             </a:fld>
             <a:endParaRPr kumimoji="0" lang="en-US" sz="1200" b="0" i="0" u="none" strike="noStrike" kern="1200" cap="none" spc="0" normalizeH="0" baseline="0" noProof="0">
               <a:ln>
@@ -787,7 +800,7 @@
           <a:p>
             <a:fld id="{6D7D1AC5-EDA8-4631-9228-9906422CEF8D}" type="datetimeFigureOut">
               <a:rPr lang="en-US" smtClean="0"/>
-              <a:t>8/4/19</a:t>
+              <a:t>10/6/19</a:t>
             </a:fld>
             <a:endParaRPr lang="en-US"/>
           </a:p>
@@ -955,7 +968,7 @@
           <a:p>
             <a:fld id="{6D7D1AC5-EDA8-4631-9228-9906422CEF8D}" type="datetimeFigureOut">
               <a:rPr lang="en-US" smtClean="0"/>
-              <a:t>8/4/19</a:t>
+              <a:t>10/6/19</a:t>
             </a:fld>
             <a:endParaRPr lang="en-US"/>
           </a:p>
@@ -1133,7 +1146,7 @@
           <a:p>
             <a:fld id="{6D7D1AC5-EDA8-4631-9228-9906422CEF8D}" type="datetimeFigureOut">
               <a:rPr lang="en-US" smtClean="0"/>
-              <a:t>8/4/19</a:t>
+              <a:t>10/6/19</a:t>
             </a:fld>
             <a:endParaRPr lang="en-US"/>
           </a:p>
@@ -1372,7 +1385,7 @@
                 <a:tabLst/>
                 <a:defRPr/>
               </a:pPr>
-              <a:t>8/4/19</a:t>
+              <a:t>10/6/19</a:t>
             </a:fld>
             <a:endParaRPr kumimoji="0" lang="en-US" sz="1200" b="0" i="0" u="none" strike="noStrike" kern="1200" cap="none" spc="0" normalizeH="0" baseline="0" noProof="0">
               <a:ln>
@@ -1711,7 +1724,7 @@
                 <a:tabLst/>
                 <a:defRPr/>
               </a:pPr>
-              <a:t>8/4/19</a:t>
+              <a:t>10/6/19</a:t>
             </a:fld>
             <a:endParaRPr kumimoji="0" lang="en-US" sz="1200" b="0" i="0" u="none" strike="noStrike" kern="1200" cap="none" spc="0" normalizeH="0" baseline="0" noProof="0">
               <a:ln>
@@ -2116,7 +2129,7 @@
                 <a:tabLst/>
                 <a:defRPr/>
               </a:pPr>
-              <a:t>8/4/19</a:t>
+              <a:t>10/6/19</a:t>
             </a:fld>
             <a:endParaRPr kumimoji="0" lang="en-US" sz="1200" b="0" i="0" u="none" strike="noStrike" kern="1200" cap="none" spc="0" normalizeH="0" baseline="0" noProof="0">
               <a:ln>
@@ -2505,7 +2518,7 @@
                 <a:tabLst/>
                 <a:defRPr/>
               </a:pPr>
-              <a:t>8/4/19</a:t>
+              <a:t>10/6/19</a:t>
             </a:fld>
             <a:endParaRPr kumimoji="0" lang="en-US" sz="1200" b="0" i="0" u="none" strike="noStrike" kern="1200" cap="none" spc="0" normalizeH="0" baseline="0" noProof="0">
               <a:ln>
@@ -3029,7 +3042,7 @@
                 <a:tabLst/>
                 <a:defRPr/>
               </a:pPr>
-              <a:t>8/4/19</a:t>
+              <a:t>10/6/19</a:t>
             </a:fld>
             <a:endParaRPr kumimoji="0" lang="en-US" sz="1200" b="0" i="0" u="none" strike="noStrike" kern="1200" cap="none" spc="0" normalizeH="0" baseline="0" noProof="0">
               <a:ln>
@@ -3306,7 +3319,7 @@
                 <a:tabLst/>
                 <a:defRPr/>
               </a:pPr>
-              <a:t>8/4/19</a:t>
+              <a:t>10/6/19</a:t>
             </a:fld>
             <a:endParaRPr kumimoji="0" lang="en-US" sz="1200" b="0" i="0" u="none" strike="noStrike" kern="1200" cap="none" spc="0" normalizeH="0" baseline="0" noProof="0">
               <a:ln>
@@ -3561,7 +3574,7 @@
                 <a:tabLst/>
                 <a:defRPr/>
               </a:pPr>
-              <a:t>8/4/19</a:t>
+              <a:t>10/6/19</a:t>
             </a:fld>
             <a:endParaRPr kumimoji="0" lang="en-US" sz="1200" b="0" i="0" u="none" strike="noStrike" kern="1200" cap="none" spc="0" normalizeH="0" baseline="0" noProof="0">
               <a:ln>
@@ -3996,7 +4009,7 @@
                 <a:tabLst/>
                 <a:defRPr/>
               </a:pPr>
-              <a:t>8/4/19</a:t>
+              <a:t>10/6/19</a:t>
             </a:fld>
             <a:endParaRPr kumimoji="0" lang="en-US" sz="1200" b="0" i="0" u="none" strike="noStrike" kern="1200" cap="none" spc="0" normalizeH="0" baseline="0" noProof="0">
               <a:ln>
@@ -4275,7 +4288,7 @@
           <a:p>
             <a:fld id="{6D7D1AC5-EDA8-4631-9228-9906422CEF8D}" type="datetimeFigureOut">
               <a:rPr lang="en-US" smtClean="0"/>
-              <a:t>8/4/19</a:t>
+              <a:t>10/6/19</a:t>
             </a:fld>
             <a:endParaRPr lang="en-US"/>
           </a:p>
@@ -4576,7 +4589,7 @@
                 <a:tabLst/>
                 <a:defRPr/>
               </a:pPr>
-              <a:t>8/4/19</a:t>
+              <a:t>10/6/19</a:t>
             </a:fld>
             <a:endParaRPr kumimoji="0" lang="en-US" sz="1200" b="0" i="0" u="none" strike="noStrike" kern="1200" cap="none" spc="0" normalizeH="0" baseline="0" noProof="0">
               <a:ln>
@@ -4904,7 +4917,7 @@
                 <a:tabLst/>
                 <a:defRPr/>
               </a:pPr>
-              <a:t>8/4/19</a:t>
+              <a:t>10/6/19</a:t>
             </a:fld>
             <a:endParaRPr kumimoji="0" lang="en-US" sz="1200" b="0" i="0" u="none" strike="noStrike" kern="1200" cap="none" spc="0" normalizeH="0" baseline="0" noProof="0">
               <a:ln>
@@ -5242,7 +5255,7 @@
                 <a:tabLst/>
                 <a:defRPr/>
               </a:pPr>
-              <a:t>8/4/19</a:t>
+              <a:t>10/6/19</a:t>
             </a:fld>
             <a:endParaRPr kumimoji="0" lang="en-US" sz="1200" b="0" i="0" u="none" strike="noStrike" kern="1200" cap="none" spc="0" normalizeH="0" baseline="0" noProof="0">
               <a:ln>
@@ -5598,7 +5611,7 @@
           <a:p>
             <a:fld id="{6D7D1AC5-EDA8-4631-9228-9906422CEF8D}" type="datetimeFigureOut">
               <a:rPr lang="en-US" smtClean="0"/>
-              <a:t>8/4/19</a:t>
+              <a:t>10/6/19</a:t>
             </a:fld>
             <a:endParaRPr lang="en-US"/>
           </a:p>
@@ -5827,7 +5840,7 @@
           <a:p>
             <a:fld id="{6D7D1AC5-EDA8-4631-9228-9906422CEF8D}" type="datetimeFigureOut">
               <a:rPr lang="en-US" smtClean="0"/>
-              <a:t>8/4/19</a:t>
+              <a:t>10/6/19</a:t>
             </a:fld>
             <a:endParaRPr lang="en-US"/>
           </a:p>
@@ -6191,7 +6204,7 @@
           <a:p>
             <a:fld id="{6D7D1AC5-EDA8-4631-9228-9906422CEF8D}" type="datetimeFigureOut">
               <a:rPr lang="en-US" smtClean="0"/>
-              <a:t>8/4/19</a:t>
+              <a:t>10/6/19</a:t>
             </a:fld>
             <a:endParaRPr lang="en-US"/>
           </a:p>
@@ -6308,7 +6321,7 @@
           <a:p>
             <a:fld id="{6D7D1AC5-EDA8-4631-9228-9906422CEF8D}" type="datetimeFigureOut">
               <a:rPr lang="en-US" smtClean="0"/>
-              <a:t>8/4/19</a:t>
+              <a:t>10/6/19</a:t>
             </a:fld>
             <a:endParaRPr lang="en-US"/>
           </a:p>
@@ -6403,7 +6416,7 @@
           <a:p>
             <a:fld id="{6D7D1AC5-EDA8-4631-9228-9906422CEF8D}" type="datetimeFigureOut">
               <a:rPr lang="en-US" smtClean="0"/>
-              <a:t>8/4/19</a:t>
+              <a:t>10/6/19</a:t>
             </a:fld>
             <a:endParaRPr lang="en-US"/>
           </a:p>
@@ -6678,7 +6691,7 @@
           <a:p>
             <a:fld id="{6D7D1AC5-EDA8-4631-9228-9906422CEF8D}" type="datetimeFigureOut">
               <a:rPr lang="en-US" smtClean="0"/>
-              <a:t>8/4/19</a:t>
+              <a:t>10/6/19</a:t>
             </a:fld>
             <a:endParaRPr lang="en-US"/>
           </a:p>
@@ -6930,7 +6943,7 @@
           <a:p>
             <a:fld id="{6D7D1AC5-EDA8-4631-9228-9906422CEF8D}" type="datetimeFigureOut">
               <a:rPr lang="en-US" smtClean="0"/>
-              <a:t>8/4/19</a:t>
+              <a:t>10/6/19</a:t>
             </a:fld>
             <a:endParaRPr lang="en-US"/>
           </a:p>
@@ -7141,7 +7154,7 @@
           <a:p>
             <a:fld id="{6D7D1AC5-EDA8-4631-9228-9906422CEF8D}" type="datetimeFigureOut">
               <a:rPr lang="en-US" smtClean="0"/>
-              <a:t>8/4/19</a:t>
+              <a:t>10/6/19</a:t>
             </a:fld>
             <a:endParaRPr lang="en-US"/>
           </a:p>
@@ -7728,7 +7741,7 @@
                 <a:tabLst/>
                 <a:defRPr/>
               </a:pPr>
-              <a:t>8/4/19</a:t>
+              <a:t>10/6/19</a:t>
             </a:fld>
             <a:endParaRPr kumimoji="0" lang="en-US" sz="1200" b="0" i="0" u="none" strike="noStrike" kern="1200" cap="none" spc="0" normalizeH="0" baseline="0" noProof="0">
               <a:ln>
@@ -10210,25 +10223,6 @@
           </a:p>
         </p:txBody>
       </p:sp>
-      <p:sp>
-        <p:nvSpPr>
-          <p:cNvPr id="5" name="Subtitle 4"/>
-          <p:cNvSpPr>
-            <a:spLocks noGrp="1"/>
-          </p:cNvSpPr>
-          <p:nvPr>
-            <p:ph type="subTitle" idx="1"/>
-          </p:nvPr>
-        </p:nvSpPr>
-        <p:spPr/>
-        <p:txBody>
-          <a:bodyPr/>
-          <a:lstStyle/>
-          <a:p>
-            <a:endParaRPr lang="en-US" dirty="0"/>
-          </a:p>
-        </p:txBody>
-      </p:sp>
     </p:spTree>
     <p:extLst>
       <p:ext uri="{BB962C8B-B14F-4D97-AF65-F5344CB8AC3E}">
@@ -10441,8 +10435,8 @@
         </p:nvSpPr>
         <p:spPr>
           <a:xfrm>
-            <a:off x="330200" y="1825624"/>
-            <a:ext cx="11023600" cy="4779061"/>
+            <a:off x="177799" y="1833645"/>
+            <a:ext cx="11827933" cy="4779061"/>
           </a:xfrm>
         </p:spPr>
         <p:txBody>
@@ -10994,27 +10988,8 @@
           <a:p>
             <a:r>
               <a:rPr lang="en-US" sz="7200" dirty="0"/>
-              <a:t>Some More Details…</a:t>
-            </a:r>
-          </a:p>
-        </p:txBody>
-      </p:sp>
-      <p:sp>
-        <p:nvSpPr>
-          <p:cNvPr id="5" name="Subtitle 4"/>
-          <p:cNvSpPr>
-            <a:spLocks noGrp="1"/>
-          </p:cNvSpPr>
-          <p:nvPr>
-            <p:ph type="subTitle" idx="1"/>
-          </p:nvPr>
-        </p:nvSpPr>
-        <p:spPr/>
-        <p:txBody>
-          <a:bodyPr/>
-          <a:lstStyle/>
-          <a:p>
-            <a:endParaRPr lang="en-US"/>
+              <a:t>Microservice Components</a:t>
+            </a:r>
           </a:p>
         </p:txBody>
       </p:sp>
@@ -14099,7 +14074,13 @@
       </p:grpSpPr>
       <p:sp>
         <p:nvSpPr>
-          <p:cNvPr id="2" name="Title 1"/>
+          <p:cNvPr id="4" name="Title 3">
+            <a:extLst>
+              <a:ext uri="{FF2B5EF4-FFF2-40B4-BE49-F238E27FC236}">
+                <a16:creationId xmlns:a16="http://schemas.microsoft.com/office/drawing/2014/main" id="{C2EEC780-FCDC-C24D-B685-5FFCE21BAAFD}"/>
+              </a:ext>
+            </a:extLst>
+          </p:cNvPr>
           <p:cNvSpPr>
             <a:spLocks noGrp="1"/>
           </p:cNvSpPr>
@@ -14113,90 +14094,8 @@
           <a:lstStyle/>
           <a:p>
             <a:r>
-              <a:rPr lang="en-US" sz="6600" dirty="0"/>
-              <a:t>Conclusion</a:t>
-            </a:r>
-            <a:endParaRPr lang="en-US" dirty="0"/>
-          </a:p>
-        </p:txBody>
-      </p:sp>
-      <p:sp>
-        <p:nvSpPr>
-          <p:cNvPr id="3" name="Content Placeholder 2"/>
-          <p:cNvSpPr>
-            <a:spLocks noGrp="1"/>
-          </p:cNvSpPr>
-          <p:nvPr>
-            <p:ph idx="1"/>
-          </p:nvPr>
-        </p:nvSpPr>
-        <p:spPr>
-          <a:xfrm>
-            <a:off x="313267" y="1825625"/>
-            <a:ext cx="11040533" cy="4351338"/>
-          </a:xfrm>
-        </p:spPr>
-        <p:txBody>
-          <a:bodyPr>
-            <a:normAutofit/>
-          </a:bodyPr>
-          <a:lstStyle/>
-          <a:p>
-            <a:r>
-              <a:rPr lang="en-US" sz="3200" dirty="0" err="1"/>
-              <a:t>MicroServices</a:t>
-            </a:r>
-            <a:r>
-              <a:rPr lang="en-US" sz="3200" dirty="0"/>
-              <a:t> are extremely important and common in industry</a:t>
-            </a:r>
-          </a:p>
-          <a:p>
-            <a:r>
-              <a:rPr lang="en-US" sz="3200" dirty="0"/>
-              <a:t>Aimed at </a:t>
-            </a:r>
-            <a:r>
-              <a:rPr lang="en-US" sz="3200" i="1" dirty="0"/>
-              <a:t>large systems</a:t>
-            </a:r>
-            <a:r>
-              <a:rPr lang="en-US" sz="3200" dirty="0"/>
-              <a:t>, that need to be maintained for years</a:t>
-            </a:r>
-          </a:p>
-          <a:p>
-            <a:pPr lvl="1"/>
-            <a:r>
-              <a:rPr lang="en-US" sz="2800" dirty="0"/>
-              <a:t>think of Amazon, Netflix, Google, etc.</a:t>
-            </a:r>
-          </a:p>
-          <a:p>
-            <a:r>
-              <a:rPr lang="en-US" sz="3200" b="1" dirty="0"/>
-              <a:t>No Silver Bullet</a:t>
-            </a:r>
-          </a:p>
-          <a:p>
-            <a:pPr lvl="1"/>
-            <a:r>
-              <a:rPr lang="en-US" sz="2800" dirty="0"/>
-              <a:t>For small systems, monoliths are better</a:t>
-            </a:r>
-          </a:p>
-          <a:p>
-            <a:r>
-              <a:rPr lang="en-US" sz="3200" dirty="0"/>
-              <a:t>Challenge: understand the benefits of </a:t>
-            </a:r>
-            <a:r>
-              <a:rPr lang="en-US" sz="3200" dirty="0" err="1"/>
-              <a:t>microservices</a:t>
-            </a:r>
-            <a:r>
-              <a:rPr lang="en-US" sz="3200" dirty="0"/>
-              <a:t> when all your school projects are actually “tiny” (even your BSc project)</a:t>
+              <a:rPr lang="en-US" dirty="0"/>
+              <a:t>Docker</a:t>
             </a:r>
           </a:p>
         </p:txBody>
@@ -14204,7 +14103,7 @@
     </p:spTree>
     <p:extLst>
       <p:ext uri="{BB962C8B-B14F-4D97-AF65-F5344CB8AC3E}">
-        <p14:creationId xmlns:p14="http://schemas.microsoft.com/office/powerpoint/2010/main" val="2750228027"/>
+        <p14:creationId xmlns:p14="http://schemas.microsoft.com/office/powerpoint/2010/main" val="2922510832"/>
       </p:ext>
     </p:extLst>
   </p:cSld>
@@ -14365,7 +14264,7 @@
       </p:grpSpPr>
       <p:sp>
         <p:nvSpPr>
-          <p:cNvPr id="4" name="Title 3"/>
+          <p:cNvPr id="2" name="Title 1"/>
           <p:cNvSpPr>
             <a:spLocks noGrp="1"/>
           </p:cNvSpPr>
@@ -14379,19 +14278,15 @@
           <a:lstStyle/>
           <a:p>
             <a:r>
-              <a:rPr lang="en-US" dirty="0" err="1"/>
-              <a:t>Git</a:t>
-            </a:r>
-            <a:r>
               <a:rPr lang="en-US" dirty="0"/>
-              <a:t> Repository Modules</a:t>
-            </a:r>
-          </a:p>
-        </p:txBody>
-      </p:sp>
-      <p:sp>
-        <p:nvSpPr>
-          <p:cNvPr id="5" name="Content Placeholder 4"/>
+              <a:t>How to Use Docker?</a:t>
+            </a:r>
+          </a:p>
+        </p:txBody>
+      </p:sp>
+      <p:sp>
+        <p:nvSpPr>
+          <p:cNvPr id="3" name="Content Placeholder 2"/>
           <p:cNvSpPr>
             <a:spLocks noGrp="1"/>
           </p:cNvSpPr>
@@ -14401,8 +14296,8 @@
         </p:nvSpPr>
         <p:spPr>
           <a:xfrm>
-            <a:off x="296561" y="1825625"/>
-            <a:ext cx="11532973" cy="4972740"/>
+            <a:off x="239843" y="1825624"/>
+            <a:ext cx="11789764" cy="4879975"/>
           </a:xfrm>
         </p:spPr>
         <p:txBody>
@@ -14412,69 +14307,1467 @@
           <a:lstStyle/>
           <a:p>
             <a:r>
+              <a:rPr lang="en-US" dirty="0"/>
+              <a:t>First you need to install it</a:t>
+            </a:r>
+          </a:p>
+          <a:p>
+            <a:pPr lvl="1"/>
+            <a:r>
+              <a:rPr lang="en-US" dirty="0">
+                <a:hlinkClick r:id="rId2"/>
+              </a:rPr>
+              <a:t>https://store.docker.com/</a:t>
+            </a:r>
+            <a:endParaRPr lang="en-US" dirty="0"/>
+          </a:p>
+          <a:p>
+            <a:pPr lvl="1"/>
+            <a:r>
+              <a:rPr lang="en-US" dirty="0"/>
+              <a:t>Note: if you are using Windows, Home Edition might not be enough. You would need a better version, like the Educational one, which you should be able to freely get from school</a:t>
+            </a:r>
+          </a:p>
+          <a:p>
+            <a:r>
+              <a:rPr lang="en-US" dirty="0"/>
+              <a:t>To run existing images, you just need to type commands from a shell terminal (</a:t>
+            </a:r>
+            <a:r>
+              <a:rPr lang="en-US" dirty="0" err="1"/>
+              <a:t>eg</a:t>
+            </a:r>
+            <a:r>
+              <a:rPr lang="en-US" dirty="0"/>
+              <a:t>, </a:t>
+            </a:r>
+            <a:r>
+              <a:rPr lang="en-US" dirty="0" err="1"/>
+              <a:t>GitBash</a:t>
+            </a:r>
+            <a:r>
+              <a:rPr lang="en-US" dirty="0"/>
+              <a:t>)</a:t>
+            </a:r>
+          </a:p>
+          <a:p>
+            <a:r>
+              <a:rPr lang="en-US" dirty="0"/>
+              <a:t>When you are writing your own projects, you need to create configuration files </a:t>
+            </a:r>
+          </a:p>
+          <a:p>
+            <a:pPr lvl="1"/>
+            <a:r>
+              <a:rPr lang="en-US" i="1" dirty="0" err="1"/>
+              <a:t>Dockerfile</a:t>
+            </a:r>
+            <a:r>
+              <a:rPr lang="en-US" dirty="0"/>
+              <a:t>: specify how to build an OS image</a:t>
+            </a:r>
+          </a:p>
+          <a:p>
+            <a:pPr lvl="1"/>
+            <a:r>
+              <a:rPr lang="en-US" i="1" dirty="0" err="1"/>
+              <a:t>docker-compose.yml</a:t>
+            </a:r>
+            <a:r>
+              <a:rPr lang="en-US" dirty="0"/>
+              <a:t>: for handling multi-images</a:t>
+            </a:r>
+          </a:p>
+          <a:p>
+            <a:r>
+              <a:rPr lang="en-US" dirty="0"/>
+              <a:t>Then, use </a:t>
+            </a:r>
+            <a:r>
+              <a:rPr lang="en-US" i="1" dirty="0" err="1"/>
+              <a:t>docker</a:t>
+            </a:r>
+            <a:r>
+              <a:rPr lang="en-US" dirty="0"/>
+              <a:t> and </a:t>
+            </a:r>
+            <a:r>
+              <a:rPr lang="en-US" i="1" dirty="0" err="1"/>
+              <a:t>docker</a:t>
+            </a:r>
+            <a:r>
               <a:rPr lang="en-US" i="1" dirty="0"/>
-              <a:t>NOTE: most of the explanations will be directly in the code as comments, and not here in the slides</a:t>
+              <a:t>-compose</a:t>
+            </a:r>
+            <a:r>
+              <a:rPr lang="en-US" dirty="0"/>
+              <a:t> commands from the command line</a:t>
+            </a:r>
+          </a:p>
+          <a:p>
+            <a:endParaRPr lang="en-US" dirty="0"/>
+          </a:p>
+          <a:p>
+            <a:endParaRPr lang="en-US" dirty="0"/>
+          </a:p>
+        </p:txBody>
+      </p:sp>
+    </p:spTree>
+    <p:extLst>
+      <p:ext uri="{BB962C8B-B14F-4D97-AF65-F5344CB8AC3E}">
+        <p14:creationId xmlns:p14="http://schemas.microsoft.com/office/powerpoint/2010/main" val="2238968764"/>
+      </p:ext>
+    </p:extLst>
+  </p:cSld>
+  <p:clrMapOvr>
+    <a:masterClrMapping/>
+  </p:clrMapOvr>
+</p:sld>
+</file>
+
+<file path=ppt/slides/slide51.xml><?xml version="1.0" encoding="utf-8"?>
+<p:sld xmlns:a="http://schemas.openxmlformats.org/drawingml/2006/main" xmlns:r="http://schemas.openxmlformats.org/officeDocument/2006/relationships" xmlns:p="http://schemas.openxmlformats.org/presentationml/2006/main">
+  <p:cSld>
+    <p:spTree>
+      <p:nvGrpSpPr>
+        <p:cNvPr id="1" name=""/>
+        <p:cNvGrpSpPr/>
+        <p:nvPr/>
+      </p:nvGrpSpPr>
+      <p:grpSpPr>
+        <a:xfrm>
+          <a:off x="0" y="0"/>
+          <a:ext cx="0" cy="0"/>
+          <a:chOff x="0" y="0"/>
+          <a:chExt cx="0" cy="0"/>
+        </a:xfrm>
+      </p:grpSpPr>
+      <p:sp>
+        <p:nvSpPr>
+          <p:cNvPr id="2" name="Title 1"/>
+          <p:cNvSpPr>
+            <a:spLocks noGrp="1"/>
+          </p:cNvSpPr>
+          <p:nvPr>
+            <p:ph type="title"/>
+          </p:nvPr>
+        </p:nvSpPr>
+        <p:spPr/>
+        <p:txBody>
+          <a:bodyPr/>
+          <a:lstStyle/>
+          <a:p>
+            <a:r>
+              <a:rPr lang="en-US" dirty="0"/>
+              <a:t>Docker Examples</a:t>
+            </a:r>
+          </a:p>
+        </p:txBody>
+      </p:sp>
+      <p:sp>
+        <p:nvSpPr>
+          <p:cNvPr id="3" name="Content Placeholder 2"/>
+          <p:cNvSpPr>
+            <a:spLocks noGrp="1"/>
+          </p:cNvSpPr>
+          <p:nvPr>
+            <p:ph idx="1"/>
+          </p:nvPr>
+        </p:nvSpPr>
+        <p:spPr>
+          <a:xfrm>
+            <a:off x="265043" y="1825625"/>
+            <a:ext cx="11675166" cy="4773958"/>
+          </a:xfrm>
+        </p:spPr>
+        <p:txBody>
+          <a:bodyPr/>
+          <a:lstStyle/>
+          <a:p>
+            <a:r>
+              <a:rPr lang="en-US" dirty="0">
+                <a:hlinkClick r:id="rId2"/>
+              </a:rPr>
+              <a:t>https://docs.docker.com/get-started/</a:t>
+            </a:r>
+            <a:endParaRPr lang="en-US" dirty="0"/>
+          </a:p>
+          <a:p>
+            <a:r>
+              <a:rPr lang="en-US" dirty="0">
+                <a:hlinkClick r:id="rId3"/>
+              </a:rPr>
+              <a:t>https://hub.docker.com/r/docker/whalesay/</a:t>
+            </a:r>
+            <a:endParaRPr lang="en-US" dirty="0"/>
+          </a:p>
+          <a:p>
+            <a:r>
+              <a:rPr lang="en-US" b="1" i="1" dirty="0" err="1"/>
+              <a:t>docker</a:t>
+            </a:r>
+            <a:r>
+              <a:rPr lang="en-US" b="1" i="1" dirty="0"/>
+              <a:t> run </a:t>
+            </a:r>
+            <a:r>
+              <a:rPr lang="en-US" b="1" i="1" dirty="0" err="1"/>
+              <a:t>docker</a:t>
+            </a:r>
+            <a:r>
+              <a:rPr lang="en-US" b="1" i="1" dirty="0"/>
+              <a:t>/</a:t>
+            </a:r>
+            <a:r>
+              <a:rPr lang="en-US" b="1" i="1" dirty="0" err="1"/>
+              <a:t>whalesay</a:t>
+            </a:r>
+            <a:r>
+              <a:rPr lang="en-US" b="1" i="1" dirty="0"/>
+              <a:t> </a:t>
+            </a:r>
+            <a:r>
+              <a:rPr lang="en-US" b="1" i="1" dirty="0" err="1"/>
+              <a:t>cowsay</a:t>
+            </a:r>
+            <a:r>
+              <a:rPr lang="en-US" b="1" i="1" dirty="0"/>
+              <a:t> boo</a:t>
+            </a:r>
+          </a:p>
+          <a:p>
+            <a:pPr lvl="1"/>
+            <a:r>
+              <a:rPr lang="en-US" dirty="0"/>
+              <a:t>This will install the image “</a:t>
+            </a:r>
+            <a:r>
+              <a:rPr lang="en-US" i="1" dirty="0" err="1"/>
+              <a:t>docker</a:t>
+            </a:r>
+            <a:r>
+              <a:rPr lang="en-US" i="1" dirty="0"/>
+              <a:t>/</a:t>
+            </a:r>
+            <a:r>
+              <a:rPr lang="en-US" i="1" dirty="0" err="1"/>
+              <a:t>whalesay</a:t>
+            </a:r>
+            <a:r>
+              <a:rPr lang="en-US" dirty="0"/>
+              <a:t>”, and run it with input “</a:t>
+            </a:r>
+            <a:r>
+              <a:rPr lang="en-US" dirty="0" err="1"/>
+              <a:t>cowsay</a:t>
+            </a:r>
+            <a:r>
+              <a:rPr lang="en-US" dirty="0"/>
+              <a:t> boo”</a:t>
+            </a:r>
+          </a:p>
+          <a:p>
+            <a:pPr lvl="1"/>
+            <a:r>
+              <a:rPr lang="en-US" dirty="0"/>
+              <a:t>First time you run it, the “</a:t>
+            </a:r>
+            <a:r>
+              <a:rPr lang="en-US" i="1" dirty="0" err="1"/>
+              <a:t>docker</a:t>
+            </a:r>
+            <a:r>
+              <a:rPr lang="en-US" i="1" dirty="0"/>
+              <a:t>/</a:t>
+            </a:r>
+            <a:r>
+              <a:rPr lang="en-US" i="1" dirty="0" err="1"/>
+              <a:t>whalesay</a:t>
+            </a:r>
+            <a:r>
+              <a:rPr lang="en-US" dirty="0"/>
+              <a:t>” image will be downloaded</a:t>
+            </a:r>
+          </a:p>
+          <a:p>
+            <a:endParaRPr lang="en-US" dirty="0"/>
+          </a:p>
+        </p:txBody>
+      </p:sp>
+    </p:spTree>
+    <p:extLst>
+      <p:ext uri="{BB962C8B-B14F-4D97-AF65-F5344CB8AC3E}">
+        <p14:creationId xmlns:p14="http://schemas.microsoft.com/office/powerpoint/2010/main" val="2221539240"/>
+      </p:ext>
+    </p:extLst>
+  </p:cSld>
+  <p:clrMapOvr>
+    <a:masterClrMapping/>
+  </p:clrMapOvr>
+</p:sld>
+</file>
+
+<file path=ppt/slides/slide52.xml><?xml version="1.0" encoding="utf-8"?>
+<p:sld xmlns:a="http://schemas.openxmlformats.org/drawingml/2006/main" xmlns:r="http://schemas.openxmlformats.org/officeDocument/2006/relationships" xmlns:p="http://schemas.openxmlformats.org/presentationml/2006/main">
+  <p:cSld>
+    <p:spTree>
+      <p:nvGrpSpPr>
+        <p:cNvPr id="1" name=""/>
+        <p:cNvGrpSpPr/>
+        <p:nvPr/>
+      </p:nvGrpSpPr>
+      <p:grpSpPr>
+        <a:xfrm>
+          <a:off x="0" y="0"/>
+          <a:ext cx="0" cy="0"/>
+          <a:chOff x="0" y="0"/>
+          <a:chExt cx="0" cy="0"/>
+        </a:xfrm>
+      </p:grpSpPr>
+      <p:pic>
+        <p:nvPicPr>
+          <p:cNvPr id="4" name="Picture 3"/>
+          <p:cNvPicPr>
+            <a:picLocks noChangeAspect="1"/>
+          </p:cNvPicPr>
+          <p:nvPr/>
+        </p:nvPicPr>
+        <p:blipFill>
+          <a:blip r:embed="rId2">
+            <a:extLst>
+              <a:ext uri="{28A0092B-C50C-407E-A947-70E740481C1C}">
+                <a14:useLocalDpi xmlns:a14="http://schemas.microsoft.com/office/drawing/2010/main" val="0"/>
+              </a:ext>
+            </a:extLst>
+          </a:blip>
+          <a:stretch>
+            <a:fillRect/>
+          </a:stretch>
+        </p:blipFill>
+        <p:spPr>
+          <a:xfrm>
+            <a:off x="1625600" y="0"/>
+            <a:ext cx="8938517" cy="6858000"/>
+          </a:xfrm>
+          <a:prstGeom prst="rect">
+            <a:avLst/>
+          </a:prstGeom>
+        </p:spPr>
+      </p:pic>
+    </p:spTree>
+    <p:extLst>
+      <p:ext uri="{BB962C8B-B14F-4D97-AF65-F5344CB8AC3E}">
+        <p14:creationId xmlns:p14="http://schemas.microsoft.com/office/powerpoint/2010/main" val="1578433043"/>
+      </p:ext>
+    </p:extLst>
+  </p:cSld>
+  <p:clrMapOvr>
+    <a:masterClrMapping/>
+  </p:clrMapOvr>
+</p:sld>
+</file>
+
+<file path=ppt/slides/slide53.xml><?xml version="1.0" encoding="utf-8"?>
+<p:sld xmlns:a="http://schemas.openxmlformats.org/drawingml/2006/main" xmlns:r="http://schemas.openxmlformats.org/officeDocument/2006/relationships" xmlns:p="http://schemas.openxmlformats.org/presentationml/2006/main">
+  <p:cSld>
+    <p:spTree>
+      <p:nvGrpSpPr>
+        <p:cNvPr id="1" name=""/>
+        <p:cNvGrpSpPr/>
+        <p:nvPr/>
+      </p:nvGrpSpPr>
+      <p:grpSpPr>
+        <a:xfrm>
+          <a:off x="0" y="0"/>
+          <a:ext cx="0" cy="0"/>
+          <a:chOff x="0" y="0"/>
+          <a:chExt cx="0" cy="0"/>
+        </a:xfrm>
+      </p:grpSpPr>
+      <p:sp>
+        <p:nvSpPr>
+          <p:cNvPr id="2" name="Title 1"/>
+          <p:cNvSpPr>
+            <a:spLocks noGrp="1"/>
+          </p:cNvSpPr>
+          <p:nvPr>
+            <p:ph type="title"/>
+          </p:nvPr>
+        </p:nvSpPr>
+        <p:spPr>
+          <a:xfrm>
+            <a:off x="818322" y="77449"/>
+            <a:ext cx="10515600" cy="939694"/>
+          </a:xfrm>
+        </p:spPr>
+        <p:txBody>
+          <a:bodyPr>
+            <a:normAutofit/>
+          </a:bodyPr>
+          <a:lstStyle/>
+          <a:p>
+            <a:r>
+              <a:rPr lang="en-US" dirty="0"/>
+              <a:t>Custom Images	</a:t>
+            </a:r>
+          </a:p>
+        </p:txBody>
+      </p:sp>
+      <p:sp>
+        <p:nvSpPr>
+          <p:cNvPr id="3" name="Content Placeholder 2"/>
+          <p:cNvSpPr>
+            <a:spLocks noGrp="1"/>
+          </p:cNvSpPr>
+          <p:nvPr>
+            <p:ph idx="1"/>
+          </p:nvPr>
+        </p:nvSpPr>
+        <p:spPr>
+          <a:xfrm>
+            <a:off x="270999" y="1500027"/>
+            <a:ext cx="11780587" cy="5276154"/>
+          </a:xfrm>
+        </p:spPr>
+        <p:txBody>
+          <a:bodyPr>
+            <a:normAutofit fontScale="85000" lnSpcReduction="20000"/>
+          </a:bodyPr>
+          <a:lstStyle/>
+          <a:p>
+            <a:r>
+              <a:rPr lang="en-US" dirty="0"/>
+              <a:t>Extend existing images to run the applications you develop</a:t>
+            </a:r>
+          </a:p>
+          <a:p>
+            <a:pPr lvl="1"/>
+            <a:r>
+              <a:rPr lang="en-US" dirty="0"/>
+              <a:t>Just need to create a text file called “</a:t>
+            </a:r>
+            <a:r>
+              <a:rPr lang="en-US" i="1" dirty="0" err="1"/>
+              <a:t>Dockerfile</a:t>
+            </a:r>
+            <a:r>
+              <a:rPr lang="en-US" dirty="0"/>
+              <a:t>”</a:t>
+            </a:r>
+          </a:p>
+          <a:p>
+            <a:r>
+              <a:rPr lang="en-US" b="1" dirty="0"/>
+              <a:t>FROM:</a:t>
+            </a:r>
+            <a:r>
+              <a:rPr lang="en-US" dirty="0"/>
+              <a:t> specify the base OS image</a:t>
+            </a:r>
+          </a:p>
+          <a:p>
+            <a:r>
+              <a:rPr lang="en-US" b="1" dirty="0"/>
+              <a:t>RUN</a:t>
+            </a:r>
+            <a:r>
+              <a:rPr lang="en-US" dirty="0"/>
+              <a:t>: execute commands in the virtual OS to set it up, like installing programs or create files/directories</a:t>
+            </a:r>
+          </a:p>
+          <a:p>
+            <a:r>
+              <a:rPr lang="en-US" b="1" dirty="0"/>
+              <a:t>CMD</a:t>
+            </a:r>
+            <a:r>
+              <a:rPr lang="en-US" dirty="0"/>
+              <a:t>: the actual command for your application</a:t>
+            </a:r>
+          </a:p>
+          <a:p>
+            <a:r>
+              <a:rPr lang="en-US" b="1" dirty="0"/>
+              <a:t>ENV</a:t>
+            </a:r>
+            <a:r>
+              <a:rPr lang="en-US" dirty="0"/>
+              <a:t>: define an environment variable</a:t>
+            </a:r>
+          </a:p>
+          <a:p>
+            <a:r>
+              <a:rPr lang="en-US" b="1" dirty="0"/>
+              <a:t>COPY</a:t>
+            </a:r>
+            <a:r>
+              <a:rPr lang="en-US" dirty="0"/>
+              <a:t>: take a file X from your hard-disk, and copy it over to the Docker image at the given path Y</a:t>
+            </a:r>
+          </a:p>
+          <a:p>
+            <a:pPr lvl="1"/>
+            <a:r>
+              <a:rPr lang="en-US" dirty="0"/>
+              <a:t>When Docker image runs, it can access X at path Y, even when you deploy the image on a remote server</a:t>
+            </a:r>
+          </a:p>
+          <a:p>
+            <a:pPr lvl="1"/>
+            <a:r>
+              <a:rPr lang="en-US" dirty="0"/>
+              <a:t>Note, there is also an </a:t>
+            </a:r>
+            <a:r>
+              <a:rPr lang="en-US" b="1" dirty="0"/>
+              <a:t>ADD</a:t>
+            </a:r>
+            <a:r>
+              <a:rPr lang="en-US" dirty="0"/>
+              <a:t> option. Do NOT use it (</a:t>
+            </a:r>
+            <a:r>
+              <a:rPr lang="en-US" dirty="0" err="1"/>
+              <a:t>ie</a:t>
+            </a:r>
+            <a:r>
+              <a:rPr lang="en-US" dirty="0"/>
+              <a:t>, not recommended, as having side-effects besides adding files)</a:t>
+            </a:r>
+          </a:p>
+          <a:p>
+            <a:r>
+              <a:rPr lang="en-US" b="1" dirty="0"/>
+              <a:t>WORKDIR</a:t>
+            </a:r>
+            <a:r>
+              <a:rPr lang="en-US" dirty="0"/>
+              <a:t>: specify the working directory for the executed commands</a:t>
+            </a:r>
+          </a:p>
+          <a:p>
+            <a:pPr lvl="1"/>
+            <a:r>
+              <a:rPr lang="en-US" dirty="0"/>
+              <a:t>Think about it like doing “cd” to that folder, so all commands/files are relative to that folder, and you do not need to specify full path</a:t>
+            </a:r>
+          </a:p>
+          <a:p>
+            <a:r>
+              <a:rPr lang="en-US" b="1" dirty="0"/>
+              <a:t>#</a:t>
+            </a:r>
+            <a:r>
+              <a:rPr lang="en-US" dirty="0"/>
+              <a:t> are comments</a:t>
+            </a:r>
+          </a:p>
+        </p:txBody>
+      </p:sp>
+    </p:spTree>
+    <p:extLst>
+      <p:ext uri="{BB962C8B-B14F-4D97-AF65-F5344CB8AC3E}">
+        <p14:creationId xmlns:p14="http://schemas.microsoft.com/office/powerpoint/2010/main" val="3600348818"/>
+      </p:ext>
+    </p:extLst>
+  </p:cSld>
+  <p:clrMapOvr>
+    <a:masterClrMapping/>
+  </p:clrMapOvr>
+</p:sld>
+</file>
+
+<file path=ppt/slides/slide54.xml><?xml version="1.0" encoding="utf-8"?>
+<p:sld xmlns:a="http://schemas.openxmlformats.org/drawingml/2006/main" xmlns:r="http://schemas.openxmlformats.org/officeDocument/2006/relationships" xmlns:p="http://schemas.openxmlformats.org/presentationml/2006/main">
+  <p:cSld>
+    <p:spTree>
+      <p:nvGrpSpPr>
+        <p:cNvPr id="1" name=""/>
+        <p:cNvGrpSpPr/>
+        <p:nvPr/>
+      </p:nvGrpSpPr>
+      <p:grpSpPr>
+        <a:xfrm>
+          <a:off x="0" y="0"/>
+          <a:ext cx="0" cy="0"/>
+          <a:chOff x="0" y="0"/>
+          <a:chExt cx="0" cy="0"/>
+        </a:xfrm>
+      </p:grpSpPr>
+      <p:sp>
+        <p:nvSpPr>
+          <p:cNvPr id="2" name="Title 1"/>
+          <p:cNvSpPr>
+            <a:spLocks noGrp="1"/>
+          </p:cNvSpPr>
+          <p:nvPr>
+            <p:ph type="title"/>
+          </p:nvPr>
+        </p:nvSpPr>
+        <p:spPr/>
+        <p:txBody>
+          <a:bodyPr/>
+          <a:lstStyle/>
+          <a:p>
+            <a:r>
+              <a:rPr lang="en-US" dirty="0"/>
+              <a:t>Docker Commands</a:t>
+            </a:r>
+          </a:p>
+        </p:txBody>
+      </p:sp>
+      <p:sp>
+        <p:nvSpPr>
+          <p:cNvPr id="3" name="Content Placeholder 2"/>
+          <p:cNvSpPr>
+            <a:spLocks noGrp="1"/>
+          </p:cNvSpPr>
+          <p:nvPr>
+            <p:ph idx="1"/>
+          </p:nvPr>
+        </p:nvSpPr>
+        <p:spPr>
+          <a:xfrm>
+            <a:off x="265043" y="1825625"/>
+            <a:ext cx="11794435" cy="4932984"/>
+          </a:xfrm>
+        </p:spPr>
+        <p:txBody>
+          <a:bodyPr>
+            <a:normAutofit/>
+          </a:bodyPr>
+          <a:lstStyle/>
+          <a:p>
+            <a:r>
+              <a:rPr lang="en-US" b="1" i="1" dirty="0" err="1"/>
+              <a:t>docker</a:t>
+            </a:r>
+            <a:r>
+              <a:rPr lang="en-US" b="1" i="1" dirty="0"/>
+              <a:t> build -t &lt;name&gt; .</a:t>
+            </a:r>
+          </a:p>
+          <a:p>
+            <a:pPr lvl="1"/>
+            <a:r>
+              <a:rPr lang="en-US" dirty="0"/>
+              <a:t>Create an image with name &lt;</a:t>
+            </a:r>
+            <a:r>
+              <a:rPr lang="en-US" i="1" dirty="0"/>
+              <a:t>name</a:t>
+            </a:r>
+            <a:r>
+              <a:rPr lang="en-US" dirty="0"/>
+              <a:t>&gt;, from the </a:t>
+            </a:r>
+            <a:r>
+              <a:rPr lang="en-US" i="1" dirty="0" err="1"/>
+              <a:t>Dockerfile</a:t>
+            </a:r>
+            <a:r>
+              <a:rPr lang="en-US" dirty="0"/>
+              <a:t> in the current “.” folder</a:t>
+            </a:r>
+          </a:p>
+          <a:p>
+            <a:r>
+              <a:rPr lang="en-US" b="1" i="1" dirty="0" err="1"/>
+              <a:t>docker</a:t>
+            </a:r>
+            <a:r>
+              <a:rPr lang="en-US" b="1" i="1" dirty="0"/>
+              <a:t> run &lt;name&gt;</a:t>
+            </a:r>
+          </a:p>
+          <a:p>
+            <a:pPr lvl="1"/>
+            <a:r>
+              <a:rPr lang="en-US" dirty="0"/>
+              <a:t>Run the given image</a:t>
+            </a:r>
+          </a:p>
+          <a:p>
+            <a:r>
+              <a:rPr lang="en-US" b="1" dirty="0" err="1"/>
+              <a:t>docker</a:t>
+            </a:r>
+            <a:r>
+              <a:rPr lang="en-US" b="1" dirty="0"/>
+              <a:t> </a:t>
+            </a:r>
+            <a:r>
+              <a:rPr lang="en-US" b="1" dirty="0" err="1"/>
+              <a:t>ps</a:t>
             </a:r>
             <a:endParaRPr lang="en-US" b="1" dirty="0"/>
           </a:p>
           <a:p>
+            <a:pPr lvl="1"/>
+            <a:r>
+              <a:rPr lang="en-US" dirty="0"/>
+              <a:t>Show running images</a:t>
+            </a:r>
+          </a:p>
+          <a:p>
+            <a:r>
+              <a:rPr lang="en-US" b="1" dirty="0" err="1"/>
+              <a:t>docker</a:t>
+            </a:r>
             <a:r>
               <a:rPr lang="en-US" b="1" dirty="0"/>
-              <a:t>advanced/</a:t>
+              <a:t> stop &lt;id&gt;</a:t>
+            </a:r>
+          </a:p>
+          <a:p>
+            <a:pPr lvl="1"/>
+            <a:r>
+              <a:rPr lang="en-US" dirty="0"/>
+              <a:t>Stop the given running image. Note: an image can be run in several instances, with different ids</a:t>
+            </a:r>
+          </a:p>
+          <a:p>
+            <a:r>
+              <a:rPr lang="en-US" dirty="0"/>
+              <a:t>In IntelliJ, you can also install “</a:t>
+            </a:r>
+            <a:r>
+              <a:rPr lang="en-US" i="1" dirty="0"/>
+              <a:t>Docker integration</a:t>
+            </a:r>
+            <a:r>
+              <a:rPr lang="en-US" dirty="0"/>
+              <a:t>” plugin</a:t>
+            </a:r>
+          </a:p>
+          <a:p>
+            <a:endParaRPr lang="en-US" dirty="0"/>
+          </a:p>
+        </p:txBody>
+      </p:sp>
+    </p:spTree>
+    <p:extLst>
+      <p:ext uri="{BB962C8B-B14F-4D97-AF65-F5344CB8AC3E}">
+        <p14:creationId xmlns:p14="http://schemas.microsoft.com/office/powerpoint/2010/main" val="978864811"/>
+      </p:ext>
+    </p:extLst>
+  </p:cSld>
+  <p:clrMapOvr>
+    <a:masterClrMapping/>
+  </p:clrMapOvr>
+</p:sld>
+</file>
+
+<file path=ppt/slides/slide55.xml><?xml version="1.0" encoding="utf-8"?>
+<p:sld xmlns:a="http://schemas.openxmlformats.org/drawingml/2006/main" xmlns:r="http://schemas.openxmlformats.org/officeDocument/2006/relationships" xmlns:p="http://schemas.openxmlformats.org/presentationml/2006/main">
+  <p:cSld>
+    <p:spTree>
+      <p:nvGrpSpPr>
+        <p:cNvPr id="1" name=""/>
+        <p:cNvGrpSpPr/>
+        <p:nvPr/>
+      </p:nvGrpSpPr>
+      <p:grpSpPr>
+        <a:xfrm>
+          <a:off x="0" y="0"/>
+          <a:ext cx="0" cy="0"/>
+          <a:chOff x="0" y="0"/>
+          <a:chExt cx="0" cy="0"/>
+        </a:xfrm>
+      </p:grpSpPr>
+      <p:sp>
+        <p:nvSpPr>
+          <p:cNvPr id="2" name="Title 1"/>
+          <p:cNvSpPr>
+            <a:spLocks noGrp="1"/>
+          </p:cNvSpPr>
+          <p:nvPr>
+            <p:ph type="title"/>
+          </p:nvPr>
+        </p:nvSpPr>
+        <p:spPr/>
+        <p:txBody>
+          <a:bodyPr/>
+          <a:lstStyle/>
+          <a:p>
+            <a:r>
+              <a:rPr lang="en-US" dirty="0"/>
+              <a:t>Networking</a:t>
+            </a:r>
+          </a:p>
+        </p:txBody>
+      </p:sp>
+      <p:sp>
+        <p:nvSpPr>
+          <p:cNvPr id="3" name="Content Placeholder 2"/>
+          <p:cNvSpPr>
+            <a:spLocks noGrp="1"/>
+          </p:cNvSpPr>
+          <p:nvPr>
+            <p:ph idx="1"/>
+          </p:nvPr>
+        </p:nvSpPr>
+        <p:spPr>
+          <a:xfrm>
+            <a:off x="259975" y="1825624"/>
+            <a:ext cx="11761695" cy="4906869"/>
+          </a:xfrm>
+        </p:spPr>
+        <p:txBody>
+          <a:bodyPr/>
+          <a:lstStyle/>
+          <a:p>
+            <a:r>
+              <a:rPr lang="en-US" dirty="0"/>
+              <a:t>When you run a server on your local host, it will open a TCP port, typically 80 or 8080</a:t>
+            </a:r>
+          </a:p>
+          <a:p>
+            <a:r>
+              <a:rPr lang="en-US" dirty="0"/>
+              <a:t>A server running inside Docker will open the same kind of ports, but those will not be visible from the </a:t>
+            </a:r>
+            <a:r>
+              <a:rPr lang="en-US" i="1" dirty="0"/>
+              <a:t>host</a:t>
+            </a:r>
+            <a:r>
+              <a:rPr lang="en-US" dirty="0"/>
+              <a:t> OS</a:t>
+            </a:r>
+          </a:p>
+          <a:p>
+            <a:r>
+              <a:rPr lang="en-US" dirty="0"/>
+              <a:t>You need to explicitly make a mapping from </a:t>
+            </a:r>
+            <a:r>
+              <a:rPr lang="en-US" i="1" dirty="0"/>
+              <a:t>host </a:t>
+            </a:r>
+            <a:r>
+              <a:rPr lang="en-US" dirty="0"/>
+              <a:t>to </a:t>
+            </a:r>
+            <a:r>
+              <a:rPr lang="en-US" i="1" dirty="0"/>
+              <a:t>guest</a:t>
+            </a:r>
+            <a:r>
+              <a:rPr lang="en-US" dirty="0"/>
+              <a:t> ports</a:t>
+            </a:r>
+          </a:p>
+          <a:p>
+            <a:r>
+              <a:rPr lang="en-US" dirty="0"/>
+              <a:t>Ex.: </a:t>
             </a:r>
             <a:r>
               <a:rPr lang="en-US" b="1" dirty="0" err="1"/>
-              <a:t>microservice</a:t>
+              <a:t>docker</a:t>
             </a:r>
             <a:r>
               <a:rPr lang="en-US" b="1" dirty="0"/>
-              <a:t>/discovery/*</a:t>
-            </a:r>
-          </a:p>
-          <a:p>
+              <a:t> run </a:t>
+            </a:r>
+            <a:r>
+              <a:rPr lang="mr-IN" b="1" dirty="0"/>
+              <a:t>–</a:t>
+            </a:r>
             <a:r>
               <a:rPr lang="en-US" b="1" dirty="0"/>
-              <a:t>advanced/</a:t>
+              <a:t>p 80:8080 foo</a:t>
+            </a:r>
+          </a:p>
+          <a:p>
+            <a:pPr lvl="1"/>
+            <a:r>
+              <a:rPr lang="en-US" dirty="0"/>
+              <a:t>When we do a connection on localhost on port 80, it will be redirected to 8080 inside Docker</a:t>
+            </a:r>
+          </a:p>
+        </p:txBody>
+      </p:sp>
+    </p:spTree>
+    <p:extLst>
+      <p:ext uri="{BB962C8B-B14F-4D97-AF65-F5344CB8AC3E}">
+        <p14:creationId xmlns:p14="http://schemas.microsoft.com/office/powerpoint/2010/main" val="1377213914"/>
+      </p:ext>
+    </p:extLst>
+  </p:cSld>
+  <p:clrMapOvr>
+    <a:masterClrMapping/>
+  </p:clrMapOvr>
+</p:sld>
+</file>
+
+<file path=ppt/slides/slide56.xml><?xml version="1.0" encoding="utf-8"?>
+<p:sld xmlns:a="http://schemas.openxmlformats.org/drawingml/2006/main" xmlns:r="http://schemas.openxmlformats.org/officeDocument/2006/relationships" xmlns:p="http://schemas.openxmlformats.org/presentationml/2006/main">
+  <p:cSld>
+    <p:spTree>
+      <p:nvGrpSpPr>
+        <p:cNvPr id="1" name=""/>
+        <p:cNvGrpSpPr/>
+        <p:nvPr/>
+      </p:nvGrpSpPr>
+      <p:grpSpPr>
+        <a:xfrm>
+          <a:off x="0" y="0"/>
+          <a:ext cx="0" cy="0"/>
+          <a:chOff x="0" y="0"/>
+          <a:chExt cx="0" cy="0"/>
+        </a:xfrm>
+      </p:grpSpPr>
+      <p:sp>
+        <p:nvSpPr>
+          <p:cNvPr id="2" name="Title 1"/>
+          <p:cNvSpPr>
+            <a:spLocks noGrp="1"/>
+          </p:cNvSpPr>
+          <p:nvPr>
+            <p:ph type="title"/>
+          </p:nvPr>
+        </p:nvSpPr>
+        <p:spPr/>
+        <p:txBody>
+          <a:bodyPr/>
+          <a:lstStyle/>
+          <a:p>
+            <a:r>
+              <a:rPr lang="en-US" dirty="0"/>
+              <a:t>CTRL-C</a:t>
+            </a:r>
+          </a:p>
+        </p:txBody>
+      </p:sp>
+      <p:sp>
+        <p:nvSpPr>
+          <p:cNvPr id="3" name="Content Placeholder 2"/>
+          <p:cNvSpPr>
+            <a:spLocks noGrp="1"/>
+          </p:cNvSpPr>
+          <p:nvPr>
+            <p:ph idx="1"/>
+          </p:nvPr>
+        </p:nvSpPr>
+        <p:spPr>
+          <a:xfrm>
+            <a:off x="243347" y="1825625"/>
+            <a:ext cx="11769213" cy="4899640"/>
+          </a:xfrm>
+        </p:spPr>
+        <p:txBody>
+          <a:bodyPr/>
+          <a:lstStyle/>
+          <a:p>
+            <a:r>
+              <a:rPr lang="en-US" dirty="0"/>
+              <a:t>When running Docker (</a:t>
+            </a:r>
+            <a:r>
+              <a:rPr lang="en-US" dirty="0" err="1"/>
+              <a:t>eg</a:t>
+            </a:r>
+            <a:r>
+              <a:rPr lang="en-US" dirty="0"/>
+              <a:t> “</a:t>
+            </a:r>
+            <a:r>
+              <a:rPr lang="en-US" i="1" dirty="0" err="1"/>
+              <a:t>docker</a:t>
+            </a:r>
+            <a:r>
+              <a:rPr lang="en-US" i="1" dirty="0"/>
+              <a:t> run</a:t>
+            </a:r>
+            <a:r>
+              <a:rPr lang="en-US" dirty="0"/>
+              <a:t>”) in a terminal, you can use CTRL-C to stop it</a:t>
+            </a:r>
+          </a:p>
+          <a:p>
+            <a:r>
+              <a:rPr lang="en-US" dirty="0"/>
+              <a:t>On Windows/</a:t>
+            </a:r>
+            <a:r>
+              <a:rPr lang="en-US" dirty="0" err="1"/>
+              <a:t>GitBash</a:t>
+            </a:r>
+            <a:r>
+              <a:rPr lang="en-US" dirty="0"/>
+              <a:t> it </a:t>
+            </a:r>
+            <a:r>
+              <a:rPr lang="en-US" i="1" dirty="0"/>
+              <a:t>might </a:t>
+            </a:r>
+            <a:r>
+              <a:rPr lang="en-US" dirty="0"/>
+              <a:t>happen that the image still run in background</a:t>
+            </a:r>
+          </a:p>
+          <a:p>
+            <a:r>
+              <a:rPr lang="en-US" dirty="0"/>
+              <a:t>Use “</a:t>
+            </a:r>
+            <a:r>
+              <a:rPr lang="en-US" b="1" dirty="0"/>
+              <a:t>docker </a:t>
             </a:r>
             <a:r>
               <a:rPr lang="en-US" b="1" dirty="0" err="1"/>
-              <a:t>microservice</a:t>
+              <a:t>ps</a:t>
+            </a:r>
+            <a:r>
+              <a:rPr lang="en-US" dirty="0"/>
+              <a:t>” to check if indeed the case</a:t>
+            </a:r>
+          </a:p>
+          <a:p>
+            <a:r>
+              <a:rPr lang="en-US" dirty="0"/>
+              <a:t>Use “</a:t>
+            </a:r>
+            <a:r>
+              <a:rPr lang="en-US" b="1" dirty="0" err="1"/>
+              <a:t>docker</a:t>
             </a:r>
             <a:r>
               <a:rPr lang="en-US" b="1" dirty="0"/>
-              <a:t>/gateway/*</a:t>
-            </a:r>
-          </a:p>
-          <a:p>
+              <a:t> stop &lt;id&gt;</a:t>
+            </a:r>
             <a:r>
               <a:rPr lang="en-US" dirty="0"/>
-              <a:t>Study </a:t>
-            </a:r>
-            <a:r>
-              <a:rPr lang="en-US" i="1" dirty="0" err="1"/>
-              <a:t>Microservices</a:t>
-            </a:r>
-            <a:r>
-              <a:rPr lang="en-US" i="1" dirty="0"/>
-              <a:t> From Design to Deployment</a:t>
-            </a:r>
+              <a:t>” to stop an image manually</a:t>
+            </a:r>
+          </a:p>
+          <a:p>
             <a:r>
               <a:rPr lang="en-US" dirty="0"/>
-              <a:t>.</a:t>
+              <a:t>If you have Docker images running in the background, that can be a problem if they use TCP ports  </a:t>
             </a:r>
           </a:p>
           <a:p>
             <a:pPr marL="0" indent="0">
               <a:buNone/>
             </a:pPr>
-            <a:endParaRPr lang="en-US" b="1" dirty="0"/>
+            <a:endParaRPr lang="en-US" dirty="0"/>
           </a:p>
         </p:txBody>
       </p:sp>
     </p:spTree>
     <p:extLst>
       <p:ext uri="{BB962C8B-B14F-4D97-AF65-F5344CB8AC3E}">
-        <p14:creationId xmlns:p14="http://schemas.microsoft.com/office/powerpoint/2010/main" val="3684031900"/>
+        <p14:creationId xmlns:p14="http://schemas.microsoft.com/office/powerpoint/2010/main" val="3608781801"/>
+      </p:ext>
+    </p:extLst>
+  </p:cSld>
+  <p:clrMapOvr>
+    <a:masterClrMapping/>
+  </p:clrMapOvr>
+</p:sld>
+</file>
+
+<file path=ppt/slides/slide57.xml><?xml version="1.0" encoding="utf-8"?>
+<p:sld xmlns:a="http://schemas.openxmlformats.org/drawingml/2006/main" xmlns:r="http://schemas.openxmlformats.org/officeDocument/2006/relationships" xmlns:p="http://schemas.openxmlformats.org/presentationml/2006/main">
+  <p:cSld>
+    <p:spTree>
+      <p:nvGrpSpPr>
+        <p:cNvPr id="1" name=""/>
+        <p:cNvGrpSpPr/>
+        <p:nvPr/>
+      </p:nvGrpSpPr>
+      <p:grpSpPr>
+        <a:xfrm>
+          <a:off x="0" y="0"/>
+          <a:ext cx="0" cy="0"/>
+          <a:chOff x="0" y="0"/>
+          <a:chExt cx="0" cy="0"/>
+        </a:xfrm>
+      </p:grpSpPr>
+      <p:sp>
+        <p:nvSpPr>
+          <p:cNvPr id="2" name="Title 1">
+            <a:extLst>
+              <a:ext uri="{FF2B5EF4-FFF2-40B4-BE49-F238E27FC236}">
+                <a16:creationId xmlns:a16="http://schemas.microsoft.com/office/drawing/2014/main" id="{28AAAB1D-4CA9-D14E-A308-FECB00DD9E16}"/>
+              </a:ext>
+            </a:extLst>
+          </p:cNvPr>
+          <p:cNvSpPr>
+            <a:spLocks noGrp="1"/>
+          </p:cNvSpPr>
+          <p:nvPr>
+            <p:ph type="title"/>
+          </p:nvPr>
+        </p:nvSpPr>
+        <p:spPr/>
+        <p:txBody>
+          <a:bodyPr/>
+          <a:lstStyle/>
+          <a:p>
+            <a:r>
+              <a:rPr lang="en-US" dirty="0"/>
+              <a:t>Docker Compose</a:t>
+            </a:r>
+          </a:p>
+        </p:txBody>
+      </p:sp>
+      <p:sp>
+        <p:nvSpPr>
+          <p:cNvPr id="3" name="Content Placeholder 2">
+            <a:extLst>
+              <a:ext uri="{FF2B5EF4-FFF2-40B4-BE49-F238E27FC236}">
+                <a16:creationId xmlns:a16="http://schemas.microsoft.com/office/drawing/2014/main" id="{7FF0E81A-55A3-B24A-AFF9-4B9EA693EE19}"/>
+              </a:ext>
+            </a:extLst>
+          </p:cNvPr>
+          <p:cNvSpPr>
+            <a:spLocks noGrp="1"/>
+          </p:cNvSpPr>
+          <p:nvPr>
+            <p:ph idx="1"/>
+          </p:nvPr>
+        </p:nvSpPr>
+        <p:spPr>
+          <a:xfrm>
+            <a:off x="176463" y="1825625"/>
+            <a:ext cx="11823032" cy="4815807"/>
+          </a:xfrm>
+        </p:spPr>
+        <p:txBody>
+          <a:bodyPr/>
+          <a:lstStyle/>
+          <a:p>
+            <a:r>
+              <a:rPr lang="en-US" dirty="0"/>
+              <a:t>Used to start a series of docker images</a:t>
+            </a:r>
+          </a:p>
+          <a:p>
+            <a:r>
+              <a:rPr lang="en-US" dirty="0"/>
+              <a:t>All services will share the same default virtual network, so can connect to each other</a:t>
+            </a:r>
+          </a:p>
+          <a:p>
+            <a:r>
+              <a:rPr lang="en-US" dirty="0"/>
+              <a:t>Configurations in a file called </a:t>
+            </a:r>
+            <a:r>
+              <a:rPr lang="en-US" i="1" dirty="0"/>
+              <a:t>docker-</a:t>
+            </a:r>
+            <a:r>
+              <a:rPr lang="en-US" i="1" dirty="0" err="1"/>
+              <a:t>compose.yml</a:t>
+            </a:r>
+            <a:endParaRPr lang="en-US" i="1" dirty="0"/>
+          </a:p>
+          <a:p>
+            <a:r>
+              <a:rPr lang="en-US" b="1" dirty="0"/>
+              <a:t>docker-compose up</a:t>
+            </a:r>
+          </a:p>
+          <a:p>
+            <a:pPr lvl="1"/>
+            <a:r>
+              <a:rPr lang="en-US" dirty="0"/>
+              <a:t>start all images in docker-</a:t>
+            </a:r>
+            <a:r>
+              <a:rPr lang="en-US" dirty="0" err="1"/>
+              <a:t>compose.yml</a:t>
+            </a:r>
+            <a:r>
+              <a:rPr lang="en-US" dirty="0"/>
+              <a:t> in current directory</a:t>
+            </a:r>
+          </a:p>
+          <a:p>
+            <a:r>
+              <a:rPr lang="en-US" b="1" dirty="0"/>
+              <a:t>docker-compose down</a:t>
+            </a:r>
+          </a:p>
+          <a:p>
+            <a:pPr lvl="1"/>
+            <a:r>
+              <a:rPr lang="en-US" dirty="0"/>
+              <a:t>shut down the running instances</a:t>
+            </a:r>
+          </a:p>
+          <a:p>
+            <a:r>
+              <a:rPr lang="en-US" dirty="0"/>
+              <a:t>Note </a:t>
+            </a:r>
+            <a:r>
+              <a:rPr lang="en-US" i="1" dirty="0"/>
+              <a:t>docker</a:t>
+            </a:r>
+            <a:r>
+              <a:rPr lang="en-US" dirty="0"/>
+              <a:t> and </a:t>
+            </a:r>
+            <a:r>
+              <a:rPr lang="en-US" i="1" dirty="0"/>
+              <a:t>docker-compose</a:t>
+            </a:r>
+            <a:r>
+              <a:rPr lang="en-US" dirty="0"/>
+              <a:t> are two different programs </a:t>
+            </a:r>
+          </a:p>
+        </p:txBody>
+      </p:sp>
+    </p:spTree>
+    <p:extLst>
+      <p:ext uri="{BB962C8B-B14F-4D97-AF65-F5344CB8AC3E}">
+        <p14:creationId xmlns:p14="http://schemas.microsoft.com/office/powerpoint/2010/main" val="3640412196"/>
+      </p:ext>
+    </p:extLst>
+  </p:cSld>
+  <p:clrMapOvr>
+    <a:masterClrMapping/>
+  </p:clrMapOvr>
+</p:sld>
+</file>
+
+<file path=ppt/slides/slide58.xml><?xml version="1.0" encoding="utf-8"?>
+<p:sld xmlns:a="http://schemas.openxmlformats.org/drawingml/2006/main" xmlns:r="http://schemas.openxmlformats.org/officeDocument/2006/relationships" xmlns:p="http://schemas.openxmlformats.org/presentationml/2006/main">
+  <p:cSld>
+    <p:spTree>
+      <p:nvGrpSpPr>
+        <p:cNvPr id="1" name=""/>
+        <p:cNvGrpSpPr/>
+        <p:nvPr/>
+      </p:nvGrpSpPr>
+      <p:grpSpPr>
+        <a:xfrm>
+          <a:off x="0" y="0"/>
+          <a:ext cx="0" cy="0"/>
+          <a:chOff x="0" y="0"/>
+          <a:chExt cx="0" cy="0"/>
+        </a:xfrm>
+      </p:grpSpPr>
+      <p:sp>
+        <p:nvSpPr>
+          <p:cNvPr id="2" name="Title 1">
+            <a:extLst>
+              <a:ext uri="{FF2B5EF4-FFF2-40B4-BE49-F238E27FC236}">
+                <a16:creationId xmlns:a16="http://schemas.microsoft.com/office/drawing/2014/main" id="{44177D99-26A4-0249-B47B-27AB7FE9EA38}"/>
+              </a:ext>
+            </a:extLst>
+          </p:cNvPr>
+          <p:cNvSpPr>
+            <a:spLocks noGrp="1"/>
+          </p:cNvSpPr>
+          <p:nvPr>
+            <p:ph type="title"/>
+          </p:nvPr>
+        </p:nvSpPr>
+        <p:spPr/>
+        <p:txBody>
+          <a:bodyPr/>
+          <a:lstStyle/>
+          <a:p>
+            <a:r>
+              <a:rPr lang="en-US" i="1" dirty="0"/>
+              <a:t>docker-</a:t>
+            </a:r>
+            <a:r>
+              <a:rPr lang="en-US" i="1" dirty="0" err="1"/>
+              <a:t>compose.yml</a:t>
+            </a:r>
+            <a:endParaRPr lang="en-US" dirty="0"/>
+          </a:p>
+        </p:txBody>
+      </p:sp>
+      <p:sp>
+        <p:nvSpPr>
+          <p:cNvPr id="3" name="Content Placeholder 2">
+            <a:extLst>
+              <a:ext uri="{FF2B5EF4-FFF2-40B4-BE49-F238E27FC236}">
+                <a16:creationId xmlns:a16="http://schemas.microsoft.com/office/drawing/2014/main" id="{3313B2D8-07E5-3E44-96EF-81BB3BA89C67}"/>
+              </a:ext>
+            </a:extLst>
+          </p:cNvPr>
+          <p:cNvSpPr>
+            <a:spLocks noGrp="1"/>
+          </p:cNvSpPr>
+          <p:nvPr>
+            <p:ph idx="1"/>
+          </p:nvPr>
+        </p:nvSpPr>
+        <p:spPr>
+          <a:xfrm>
+            <a:off x="192505" y="1825625"/>
+            <a:ext cx="11823032" cy="4904038"/>
+          </a:xfrm>
+        </p:spPr>
+        <p:txBody>
+          <a:bodyPr/>
+          <a:lstStyle/>
+          <a:p>
+            <a:r>
+              <a:rPr lang="en-US" b="1" dirty="0"/>
+              <a:t>services</a:t>
+            </a:r>
+          </a:p>
+          <a:p>
+            <a:pPr lvl="1"/>
+            <a:r>
+              <a:rPr lang="en-US" dirty="0"/>
+              <a:t>define a list of services. The name of each service will be used by virtual DNS to resolve their IP addresses</a:t>
+            </a:r>
+          </a:p>
+          <a:p>
+            <a:r>
+              <a:rPr lang="en-US" b="1" dirty="0"/>
+              <a:t>build</a:t>
+            </a:r>
+          </a:p>
+          <a:p>
+            <a:pPr lvl="1"/>
+            <a:r>
+              <a:rPr lang="en-US" dirty="0"/>
+              <a:t>define how a service is built. Could be an existing </a:t>
+            </a:r>
+            <a:r>
+              <a:rPr lang="en-US" b="1" dirty="0"/>
+              <a:t>image</a:t>
+            </a:r>
+            <a:r>
+              <a:rPr lang="en-US" dirty="0"/>
+              <a:t> (</a:t>
+            </a:r>
+            <a:r>
+              <a:rPr lang="en-US" dirty="0" err="1"/>
+              <a:t>eg</a:t>
+            </a:r>
+            <a:r>
+              <a:rPr lang="en-US" dirty="0"/>
+              <a:t> Postgres) or a local </a:t>
+            </a:r>
+            <a:r>
+              <a:rPr lang="en-US" b="1" dirty="0" err="1"/>
+              <a:t>dockerfile</a:t>
+            </a:r>
+            <a:endParaRPr lang="en-US" b="1" dirty="0"/>
+          </a:p>
+          <a:p>
+            <a:r>
+              <a:rPr lang="en-US" b="1" dirty="0"/>
+              <a:t>ports</a:t>
+            </a:r>
+          </a:p>
+          <a:p>
+            <a:pPr lvl="1"/>
+            <a:r>
+              <a:rPr lang="en-US" dirty="0"/>
+              <a:t>specify which ports to “open”, and then can be accessed from host machine. </a:t>
+            </a:r>
+            <a:r>
+              <a:rPr lang="en-US" dirty="0" err="1"/>
+              <a:t>Eg</a:t>
+            </a:r>
+            <a:r>
+              <a:rPr lang="en-US" dirty="0"/>
+              <a:t> you usually would open a port for the Gateway</a:t>
+            </a:r>
+          </a:p>
+          <a:p>
+            <a:r>
+              <a:rPr lang="en-US" b="1" dirty="0" err="1"/>
+              <a:t>depends_on</a:t>
+            </a:r>
+            <a:endParaRPr lang="en-US" b="1" dirty="0"/>
+          </a:p>
+          <a:p>
+            <a:pPr lvl="1"/>
+            <a:r>
+              <a:rPr lang="en-US" dirty="0"/>
+              <a:t>there can be many services to boot. Can define a dependency ordering, </a:t>
+            </a:r>
+            <a:r>
+              <a:rPr lang="en-US" dirty="0" err="1"/>
+              <a:t>eg</a:t>
+            </a:r>
+            <a:r>
+              <a:rPr lang="en-US" dirty="0"/>
+              <a:t> boot databases first before the services using those</a:t>
+            </a:r>
+          </a:p>
+        </p:txBody>
+      </p:sp>
+    </p:spTree>
+    <p:extLst>
+      <p:ext uri="{BB962C8B-B14F-4D97-AF65-F5344CB8AC3E}">
+        <p14:creationId xmlns:p14="http://schemas.microsoft.com/office/powerpoint/2010/main" val="4113038216"/>
+      </p:ext>
+    </p:extLst>
+  </p:cSld>
+  <p:clrMapOvr>
+    <a:masterClrMapping/>
+  </p:clrMapOvr>
+</p:sld>
+</file>
+
+<file path=ppt/slides/slide59.xml><?xml version="1.0" encoding="utf-8"?>
+<p:sld xmlns:a="http://schemas.openxmlformats.org/drawingml/2006/main" xmlns:r="http://schemas.openxmlformats.org/officeDocument/2006/relationships" xmlns:p="http://schemas.openxmlformats.org/presentationml/2006/main">
+  <p:cSld>
+    <p:spTree>
+      <p:nvGrpSpPr>
+        <p:cNvPr id="1" name=""/>
+        <p:cNvGrpSpPr/>
+        <p:nvPr/>
+      </p:nvGrpSpPr>
+      <p:grpSpPr>
+        <a:xfrm>
+          <a:off x="0" y="0"/>
+          <a:ext cx="0" cy="0"/>
+          <a:chOff x="0" y="0"/>
+          <a:chExt cx="0" cy="0"/>
+        </a:xfrm>
+      </p:grpSpPr>
+      <p:sp>
+        <p:nvSpPr>
+          <p:cNvPr id="2" name="Title 1">
+            <a:extLst>
+              <a:ext uri="{FF2B5EF4-FFF2-40B4-BE49-F238E27FC236}">
+                <a16:creationId xmlns:a16="http://schemas.microsoft.com/office/drawing/2014/main" id="{4A4AC3EB-48D8-A54B-9579-614B8884DA89}"/>
+              </a:ext>
+            </a:extLst>
+          </p:cNvPr>
+          <p:cNvSpPr>
+            <a:spLocks noGrp="1"/>
+          </p:cNvSpPr>
+          <p:nvPr>
+            <p:ph type="title"/>
+          </p:nvPr>
+        </p:nvSpPr>
+        <p:spPr/>
+        <p:txBody>
+          <a:bodyPr/>
+          <a:lstStyle/>
+          <a:p>
+            <a:r>
+              <a:rPr lang="en-US" dirty="0"/>
+              <a:t>Code Examples</a:t>
+            </a:r>
+          </a:p>
+        </p:txBody>
+      </p:sp>
+    </p:spTree>
+    <p:extLst>
+      <p:ext uri="{BB962C8B-B14F-4D97-AF65-F5344CB8AC3E}">
+        <p14:creationId xmlns:p14="http://schemas.microsoft.com/office/powerpoint/2010/main" val="2302141957"/>
       </p:ext>
     </p:extLst>
   </p:cSld>
@@ -14610,6 +15903,2116 @@
     <p:extLst>
       <p:ext uri="{BB962C8B-B14F-4D97-AF65-F5344CB8AC3E}">
         <p14:creationId xmlns:p14="http://schemas.microsoft.com/office/powerpoint/2010/main" val="1778072370"/>
+      </p:ext>
+    </p:extLst>
+  </p:cSld>
+  <p:clrMapOvr>
+    <a:masterClrMapping/>
+  </p:clrMapOvr>
+</p:sld>
+</file>
+
+<file path=ppt/slides/slide60.xml><?xml version="1.0" encoding="utf-8"?>
+<p:sld xmlns:a="http://schemas.openxmlformats.org/drawingml/2006/main" xmlns:r="http://schemas.openxmlformats.org/officeDocument/2006/relationships" xmlns:p="http://schemas.openxmlformats.org/presentationml/2006/main">
+  <p:cSld>
+    <p:spTree>
+      <p:nvGrpSpPr>
+        <p:cNvPr id="1" name=""/>
+        <p:cNvGrpSpPr/>
+        <p:nvPr/>
+      </p:nvGrpSpPr>
+      <p:grpSpPr>
+        <a:xfrm>
+          <a:off x="0" y="0"/>
+          <a:ext cx="0" cy="0"/>
+          <a:chOff x="0" y="0"/>
+          <a:chExt cx="0" cy="0"/>
+        </a:xfrm>
+      </p:grpSpPr>
+      <p:sp>
+        <p:nvSpPr>
+          <p:cNvPr id="2" name="Title 1">
+            <a:extLst>
+              <a:ext uri="{FF2B5EF4-FFF2-40B4-BE49-F238E27FC236}">
+                <a16:creationId xmlns:a16="http://schemas.microsoft.com/office/drawing/2014/main" id="{303BAC51-6C43-0346-BE36-F9EA502CAAF2}"/>
+              </a:ext>
+            </a:extLst>
+          </p:cNvPr>
+          <p:cNvSpPr>
+            <a:spLocks noGrp="1"/>
+          </p:cNvSpPr>
+          <p:nvPr>
+            <p:ph type="title"/>
+          </p:nvPr>
+        </p:nvSpPr>
+        <p:spPr/>
+        <p:txBody>
+          <a:bodyPr/>
+          <a:lstStyle/>
+          <a:p>
+            <a:r>
+              <a:rPr lang="en-US" i="1" dirty="0"/>
+              <a:t>microservice/discovery/docker-</a:t>
+            </a:r>
+            <a:r>
+              <a:rPr lang="en-US" i="1" dirty="0" err="1"/>
+              <a:t>compose.yml</a:t>
+            </a:r>
+            <a:endParaRPr lang="en-US" i="1" dirty="0"/>
+          </a:p>
+        </p:txBody>
+      </p:sp>
+      <p:sp>
+        <p:nvSpPr>
+          <p:cNvPr id="3" name="Content Placeholder 2">
+            <a:extLst>
+              <a:ext uri="{FF2B5EF4-FFF2-40B4-BE49-F238E27FC236}">
+                <a16:creationId xmlns:a16="http://schemas.microsoft.com/office/drawing/2014/main" id="{E928EE0C-CA0A-0A44-BB55-9D69FD916588}"/>
+              </a:ext>
+            </a:extLst>
+          </p:cNvPr>
+          <p:cNvSpPr>
+            <a:spLocks noGrp="1"/>
+          </p:cNvSpPr>
+          <p:nvPr>
+            <p:ph idx="1"/>
+          </p:nvPr>
+        </p:nvSpPr>
+        <p:spPr>
+          <a:xfrm>
+            <a:off x="7611978" y="1897814"/>
+            <a:ext cx="4335379" cy="2815502"/>
+          </a:xfrm>
+        </p:spPr>
+        <p:txBody>
+          <a:bodyPr/>
+          <a:lstStyle/>
+          <a:p>
+            <a:r>
+              <a:rPr lang="en-US" dirty="0"/>
+              <a:t>A “</a:t>
+            </a:r>
+            <a:r>
+              <a:rPr lang="en-US" i="1" dirty="0"/>
+              <a:t>consumer</a:t>
+            </a:r>
+            <a:r>
+              <a:rPr lang="en-US" dirty="0"/>
+              <a:t>” that </a:t>
+            </a:r>
+            <a:r>
+              <a:rPr lang="en-US" b="1" dirty="0"/>
+              <a:t>GET</a:t>
+            </a:r>
+            <a:r>
+              <a:rPr lang="en-US" dirty="0"/>
+              <a:t> data from a “</a:t>
+            </a:r>
+            <a:r>
+              <a:rPr lang="en-US" i="1" dirty="0"/>
+              <a:t>producer</a:t>
+            </a:r>
+            <a:r>
+              <a:rPr lang="en-US" dirty="0"/>
+              <a:t>”</a:t>
+            </a:r>
+          </a:p>
+          <a:p>
+            <a:r>
+              <a:rPr lang="en-US" dirty="0"/>
+              <a:t>“</a:t>
+            </a:r>
+            <a:r>
+              <a:rPr lang="en-US" i="1" dirty="0"/>
+              <a:t>producer</a:t>
+            </a:r>
+            <a:r>
+              <a:rPr lang="en-US" dirty="0"/>
+              <a:t>” has 3 running instances</a:t>
+            </a:r>
+          </a:p>
+          <a:p>
+            <a:r>
+              <a:rPr lang="en-US" dirty="0"/>
+              <a:t>Client-side load-balanced with Eureka/Ribbon</a:t>
+            </a:r>
+          </a:p>
+        </p:txBody>
+      </p:sp>
+      <p:sp>
+        <p:nvSpPr>
+          <p:cNvPr id="4" name="Rounded Rectangle 3">
+            <a:extLst>
+              <a:ext uri="{FF2B5EF4-FFF2-40B4-BE49-F238E27FC236}">
+                <a16:creationId xmlns:a16="http://schemas.microsoft.com/office/drawing/2014/main" id="{DA3B94AE-7C0C-6D41-9466-1091081231BB}"/>
+              </a:ext>
+            </a:extLst>
+          </p:cNvPr>
+          <p:cNvSpPr/>
+          <p:nvPr/>
+        </p:nvSpPr>
+        <p:spPr>
+          <a:xfrm>
+            <a:off x="119150" y="3004102"/>
+            <a:ext cx="1438100" cy="914400"/>
+          </a:xfrm>
+          <a:prstGeom prst="roundRect">
+            <a:avLst/>
+          </a:prstGeom>
+        </p:spPr>
+        <p:style>
+          <a:lnRef idx="2">
+            <a:schemeClr val="accent1">
+              <a:shade val="50000"/>
+            </a:schemeClr>
+          </a:lnRef>
+          <a:fillRef idx="1">
+            <a:schemeClr val="accent1"/>
+          </a:fillRef>
+          <a:effectRef idx="0">
+            <a:schemeClr val="accent1"/>
+          </a:effectRef>
+          <a:fontRef idx="minor">
+            <a:schemeClr val="lt1"/>
+          </a:fontRef>
+        </p:style>
+        <p:txBody>
+          <a:bodyPr rtlCol="0" anchor="ctr"/>
+          <a:lstStyle/>
+          <a:p>
+            <a:pPr algn="ctr"/>
+            <a:r>
+              <a:rPr lang="en-US" sz="2800" dirty="0">
+                <a:solidFill>
+                  <a:schemeClr val="tx1"/>
+                </a:solidFill>
+              </a:rPr>
+              <a:t>Eureka</a:t>
+            </a:r>
+          </a:p>
+        </p:txBody>
+      </p:sp>
+      <p:sp>
+        <p:nvSpPr>
+          <p:cNvPr id="5" name="Rounded Rectangle 4">
+            <a:extLst>
+              <a:ext uri="{FF2B5EF4-FFF2-40B4-BE49-F238E27FC236}">
+                <a16:creationId xmlns:a16="http://schemas.microsoft.com/office/drawing/2014/main" id="{A289185E-CD6E-0D4E-8B9D-5E2304554624}"/>
+              </a:ext>
+            </a:extLst>
+          </p:cNvPr>
+          <p:cNvSpPr/>
+          <p:nvPr/>
+        </p:nvSpPr>
+        <p:spPr>
+          <a:xfrm>
+            <a:off x="3242108" y="2546902"/>
+            <a:ext cx="1961950" cy="914400"/>
+          </a:xfrm>
+          <a:prstGeom prst="roundRect">
+            <a:avLst/>
+          </a:prstGeom>
+          <a:solidFill>
+            <a:schemeClr val="accent4"/>
+          </a:solidFill>
+        </p:spPr>
+        <p:style>
+          <a:lnRef idx="2">
+            <a:schemeClr val="accent1">
+              <a:shade val="50000"/>
+            </a:schemeClr>
+          </a:lnRef>
+          <a:fillRef idx="1">
+            <a:schemeClr val="accent1"/>
+          </a:fillRef>
+          <a:effectRef idx="0">
+            <a:schemeClr val="accent1"/>
+          </a:effectRef>
+          <a:fontRef idx="minor">
+            <a:schemeClr val="lt1"/>
+          </a:fontRef>
+        </p:style>
+        <p:txBody>
+          <a:bodyPr rtlCol="0" anchor="ctr"/>
+          <a:lstStyle/>
+          <a:p>
+            <a:pPr algn="ctr"/>
+            <a:r>
+              <a:rPr lang="en-US" sz="2800" dirty="0">
+                <a:solidFill>
+                  <a:schemeClr val="tx1"/>
+                </a:solidFill>
+              </a:rPr>
+              <a:t>Consumer</a:t>
+            </a:r>
+          </a:p>
+        </p:txBody>
+      </p:sp>
+      <p:sp>
+        <p:nvSpPr>
+          <p:cNvPr id="6" name="Rounded Rectangle 5">
+            <a:extLst>
+              <a:ext uri="{FF2B5EF4-FFF2-40B4-BE49-F238E27FC236}">
+                <a16:creationId xmlns:a16="http://schemas.microsoft.com/office/drawing/2014/main" id="{77973470-C9AA-7944-AD7B-FF3A8E6D9B8D}"/>
+              </a:ext>
+            </a:extLst>
+          </p:cNvPr>
+          <p:cNvSpPr/>
+          <p:nvPr/>
+        </p:nvSpPr>
+        <p:spPr>
+          <a:xfrm>
+            <a:off x="790146" y="5000476"/>
+            <a:ext cx="2005992" cy="914400"/>
+          </a:xfrm>
+          <a:prstGeom prst="roundRect">
+            <a:avLst/>
+          </a:prstGeom>
+          <a:solidFill>
+            <a:schemeClr val="bg2">
+              <a:lumMod val="50000"/>
+            </a:schemeClr>
+          </a:solidFill>
+        </p:spPr>
+        <p:style>
+          <a:lnRef idx="2">
+            <a:schemeClr val="accent1">
+              <a:shade val="50000"/>
+            </a:schemeClr>
+          </a:lnRef>
+          <a:fillRef idx="1">
+            <a:schemeClr val="accent1"/>
+          </a:fillRef>
+          <a:effectRef idx="0">
+            <a:schemeClr val="accent1"/>
+          </a:effectRef>
+          <a:fontRef idx="minor">
+            <a:schemeClr val="lt1"/>
+          </a:fontRef>
+        </p:style>
+        <p:txBody>
+          <a:bodyPr rtlCol="0" anchor="ctr"/>
+          <a:lstStyle/>
+          <a:p>
+            <a:pPr algn="ctr"/>
+            <a:r>
+              <a:rPr lang="en-US" sz="2800" dirty="0">
+                <a:solidFill>
+                  <a:schemeClr val="tx1"/>
+                </a:solidFill>
+              </a:rPr>
+              <a:t>Producer A</a:t>
+            </a:r>
+          </a:p>
+        </p:txBody>
+      </p:sp>
+      <p:sp>
+        <p:nvSpPr>
+          <p:cNvPr id="8" name="Rounded Rectangle 7">
+            <a:extLst>
+              <a:ext uri="{FF2B5EF4-FFF2-40B4-BE49-F238E27FC236}">
+                <a16:creationId xmlns:a16="http://schemas.microsoft.com/office/drawing/2014/main" id="{8F5F7F2B-904F-1A47-AA84-CFF5F933C06C}"/>
+              </a:ext>
+            </a:extLst>
+          </p:cNvPr>
+          <p:cNvSpPr/>
+          <p:nvPr/>
+        </p:nvSpPr>
+        <p:spPr>
+          <a:xfrm>
+            <a:off x="3198066" y="5000476"/>
+            <a:ext cx="2005992" cy="914400"/>
+          </a:xfrm>
+          <a:prstGeom prst="roundRect">
+            <a:avLst/>
+          </a:prstGeom>
+          <a:solidFill>
+            <a:schemeClr val="bg2">
+              <a:lumMod val="50000"/>
+            </a:schemeClr>
+          </a:solidFill>
+        </p:spPr>
+        <p:style>
+          <a:lnRef idx="2">
+            <a:schemeClr val="accent1">
+              <a:shade val="50000"/>
+            </a:schemeClr>
+          </a:lnRef>
+          <a:fillRef idx="1">
+            <a:schemeClr val="accent1"/>
+          </a:fillRef>
+          <a:effectRef idx="0">
+            <a:schemeClr val="accent1"/>
+          </a:effectRef>
+          <a:fontRef idx="minor">
+            <a:schemeClr val="lt1"/>
+          </a:fontRef>
+        </p:style>
+        <p:txBody>
+          <a:bodyPr rtlCol="0" anchor="ctr"/>
+          <a:lstStyle/>
+          <a:p>
+            <a:pPr algn="ctr"/>
+            <a:r>
+              <a:rPr lang="en-US" sz="2800" dirty="0">
+                <a:solidFill>
+                  <a:schemeClr val="tx1"/>
+                </a:solidFill>
+              </a:rPr>
+              <a:t>Producer B</a:t>
+            </a:r>
+          </a:p>
+        </p:txBody>
+      </p:sp>
+      <p:sp>
+        <p:nvSpPr>
+          <p:cNvPr id="9" name="Rounded Rectangle 8">
+            <a:extLst>
+              <a:ext uri="{FF2B5EF4-FFF2-40B4-BE49-F238E27FC236}">
+                <a16:creationId xmlns:a16="http://schemas.microsoft.com/office/drawing/2014/main" id="{A8E8B83D-7026-464B-8F3A-301ABCB7CEAA}"/>
+              </a:ext>
+            </a:extLst>
+          </p:cNvPr>
+          <p:cNvSpPr/>
+          <p:nvPr/>
+        </p:nvSpPr>
+        <p:spPr>
+          <a:xfrm>
+            <a:off x="5605986" y="5000476"/>
+            <a:ext cx="2005992" cy="914400"/>
+          </a:xfrm>
+          <a:prstGeom prst="roundRect">
+            <a:avLst/>
+          </a:prstGeom>
+          <a:solidFill>
+            <a:schemeClr val="bg2">
+              <a:lumMod val="50000"/>
+            </a:schemeClr>
+          </a:solidFill>
+        </p:spPr>
+        <p:style>
+          <a:lnRef idx="2">
+            <a:schemeClr val="accent1">
+              <a:shade val="50000"/>
+            </a:schemeClr>
+          </a:lnRef>
+          <a:fillRef idx="1">
+            <a:schemeClr val="accent1"/>
+          </a:fillRef>
+          <a:effectRef idx="0">
+            <a:schemeClr val="accent1"/>
+          </a:effectRef>
+          <a:fontRef idx="minor">
+            <a:schemeClr val="lt1"/>
+          </a:fontRef>
+        </p:style>
+        <p:txBody>
+          <a:bodyPr rtlCol="0" anchor="ctr"/>
+          <a:lstStyle/>
+          <a:p>
+            <a:pPr algn="ctr"/>
+            <a:r>
+              <a:rPr lang="en-US" sz="2800" dirty="0">
+                <a:solidFill>
+                  <a:schemeClr val="tx1"/>
+                </a:solidFill>
+              </a:rPr>
+              <a:t>Producer C</a:t>
+            </a:r>
+          </a:p>
+        </p:txBody>
+      </p:sp>
+      <p:cxnSp>
+        <p:nvCxnSpPr>
+          <p:cNvPr id="11" name="Straight Arrow Connector 10">
+            <a:extLst>
+              <a:ext uri="{FF2B5EF4-FFF2-40B4-BE49-F238E27FC236}">
+                <a16:creationId xmlns:a16="http://schemas.microsoft.com/office/drawing/2014/main" id="{9FF78F12-3AB2-5F46-8B06-5F2635C410CC}"/>
+              </a:ext>
+            </a:extLst>
+          </p:cNvPr>
+          <p:cNvCxnSpPr>
+            <a:cxnSpLocks/>
+            <a:stCxn id="5" idx="2"/>
+            <a:endCxn id="8" idx="0"/>
+          </p:cNvCxnSpPr>
+          <p:nvPr/>
+        </p:nvCxnSpPr>
+        <p:spPr>
+          <a:xfrm flipH="1">
+            <a:off x="4201062" y="3461302"/>
+            <a:ext cx="22021" cy="1539174"/>
+          </a:xfrm>
+          <a:prstGeom prst="straightConnector1">
+            <a:avLst/>
+          </a:prstGeom>
+          <a:ln w="63500">
+            <a:solidFill>
+              <a:schemeClr val="tx1"/>
+            </a:solidFill>
+            <a:tailEnd type="triangle"/>
+          </a:ln>
+        </p:spPr>
+        <p:style>
+          <a:lnRef idx="1">
+            <a:schemeClr val="accent1"/>
+          </a:lnRef>
+          <a:fillRef idx="0">
+            <a:schemeClr val="accent1"/>
+          </a:fillRef>
+          <a:effectRef idx="0">
+            <a:schemeClr val="accent1"/>
+          </a:effectRef>
+          <a:fontRef idx="minor">
+            <a:schemeClr val="tx1"/>
+          </a:fontRef>
+        </p:style>
+      </p:cxnSp>
+      <p:cxnSp>
+        <p:nvCxnSpPr>
+          <p:cNvPr id="12" name="Straight Arrow Connector 11">
+            <a:extLst>
+              <a:ext uri="{FF2B5EF4-FFF2-40B4-BE49-F238E27FC236}">
+                <a16:creationId xmlns:a16="http://schemas.microsoft.com/office/drawing/2014/main" id="{9E1EE0A2-6AE9-1A40-96B2-7E5F4E13341A}"/>
+              </a:ext>
+            </a:extLst>
+          </p:cNvPr>
+          <p:cNvCxnSpPr>
+            <a:cxnSpLocks/>
+            <a:stCxn id="5" idx="2"/>
+            <a:endCxn id="6" idx="0"/>
+          </p:cNvCxnSpPr>
+          <p:nvPr/>
+        </p:nvCxnSpPr>
+        <p:spPr>
+          <a:xfrm flipH="1">
+            <a:off x="1793142" y="3461302"/>
+            <a:ext cx="2429941" cy="1539174"/>
+          </a:xfrm>
+          <a:prstGeom prst="straightConnector1">
+            <a:avLst/>
+          </a:prstGeom>
+          <a:ln w="63500">
+            <a:solidFill>
+              <a:schemeClr val="tx1"/>
+            </a:solidFill>
+            <a:tailEnd type="triangle"/>
+          </a:ln>
+        </p:spPr>
+        <p:style>
+          <a:lnRef idx="1">
+            <a:schemeClr val="accent1"/>
+          </a:lnRef>
+          <a:fillRef idx="0">
+            <a:schemeClr val="accent1"/>
+          </a:fillRef>
+          <a:effectRef idx="0">
+            <a:schemeClr val="accent1"/>
+          </a:effectRef>
+          <a:fontRef idx="minor">
+            <a:schemeClr val="tx1"/>
+          </a:fontRef>
+        </p:style>
+      </p:cxnSp>
+      <p:cxnSp>
+        <p:nvCxnSpPr>
+          <p:cNvPr id="13" name="Straight Arrow Connector 12">
+            <a:extLst>
+              <a:ext uri="{FF2B5EF4-FFF2-40B4-BE49-F238E27FC236}">
+                <a16:creationId xmlns:a16="http://schemas.microsoft.com/office/drawing/2014/main" id="{F78305E4-AD46-E146-8D8F-416548B2E376}"/>
+              </a:ext>
+            </a:extLst>
+          </p:cNvPr>
+          <p:cNvCxnSpPr>
+            <a:cxnSpLocks/>
+            <a:stCxn id="5" idx="2"/>
+            <a:endCxn id="9" idx="0"/>
+          </p:cNvCxnSpPr>
+          <p:nvPr/>
+        </p:nvCxnSpPr>
+        <p:spPr>
+          <a:xfrm>
+            <a:off x="4223083" y="3461302"/>
+            <a:ext cx="2385899" cy="1539174"/>
+          </a:xfrm>
+          <a:prstGeom prst="straightConnector1">
+            <a:avLst/>
+          </a:prstGeom>
+          <a:ln w="63500">
+            <a:solidFill>
+              <a:schemeClr val="tx1"/>
+            </a:solidFill>
+            <a:tailEnd type="triangle"/>
+          </a:ln>
+        </p:spPr>
+        <p:style>
+          <a:lnRef idx="1">
+            <a:schemeClr val="accent1"/>
+          </a:lnRef>
+          <a:fillRef idx="0">
+            <a:schemeClr val="accent1"/>
+          </a:fillRef>
+          <a:effectRef idx="0">
+            <a:schemeClr val="accent1"/>
+          </a:effectRef>
+          <a:fontRef idx="minor">
+            <a:schemeClr val="tx1"/>
+          </a:fontRef>
+        </p:style>
+      </p:cxnSp>
+      <p:cxnSp>
+        <p:nvCxnSpPr>
+          <p:cNvPr id="22" name="Straight Connector 21">
+            <a:extLst>
+              <a:ext uri="{FF2B5EF4-FFF2-40B4-BE49-F238E27FC236}">
+                <a16:creationId xmlns:a16="http://schemas.microsoft.com/office/drawing/2014/main" id="{95C50950-2DAA-E948-8B00-95A5E933E656}"/>
+              </a:ext>
+            </a:extLst>
+          </p:cNvPr>
+          <p:cNvCxnSpPr>
+            <a:cxnSpLocks/>
+            <a:stCxn id="5" idx="1"/>
+            <a:endCxn id="4" idx="3"/>
+          </p:cNvCxnSpPr>
+          <p:nvPr/>
+        </p:nvCxnSpPr>
+        <p:spPr>
+          <a:xfrm flipH="1">
+            <a:off x="1557250" y="3004102"/>
+            <a:ext cx="1684858" cy="457200"/>
+          </a:xfrm>
+          <a:prstGeom prst="line">
+            <a:avLst/>
+          </a:prstGeom>
+          <a:ln w="31750">
+            <a:solidFill>
+              <a:schemeClr val="tx1"/>
+            </a:solidFill>
+            <a:prstDash val="dash"/>
+          </a:ln>
+        </p:spPr>
+        <p:style>
+          <a:lnRef idx="1">
+            <a:schemeClr val="accent1"/>
+          </a:lnRef>
+          <a:fillRef idx="0">
+            <a:schemeClr val="accent1"/>
+          </a:fillRef>
+          <a:effectRef idx="0">
+            <a:schemeClr val="accent1"/>
+          </a:effectRef>
+          <a:fontRef idx="minor">
+            <a:schemeClr val="tx1"/>
+          </a:fontRef>
+        </p:style>
+      </p:cxnSp>
+      <p:cxnSp>
+        <p:nvCxnSpPr>
+          <p:cNvPr id="25" name="Straight Connector 24">
+            <a:extLst>
+              <a:ext uri="{FF2B5EF4-FFF2-40B4-BE49-F238E27FC236}">
+                <a16:creationId xmlns:a16="http://schemas.microsoft.com/office/drawing/2014/main" id="{78B37DA8-7147-E347-9B72-D8D8191EA4F8}"/>
+              </a:ext>
+            </a:extLst>
+          </p:cNvPr>
+          <p:cNvCxnSpPr>
+            <a:cxnSpLocks/>
+            <a:stCxn id="8" idx="0"/>
+            <a:endCxn id="4" idx="3"/>
+          </p:cNvCxnSpPr>
+          <p:nvPr/>
+        </p:nvCxnSpPr>
+        <p:spPr>
+          <a:xfrm flipH="1" flipV="1">
+            <a:off x="1557250" y="3461302"/>
+            <a:ext cx="2643812" cy="1539174"/>
+          </a:xfrm>
+          <a:prstGeom prst="line">
+            <a:avLst/>
+          </a:prstGeom>
+          <a:ln w="31750">
+            <a:solidFill>
+              <a:schemeClr val="tx1"/>
+            </a:solidFill>
+            <a:prstDash val="dash"/>
+          </a:ln>
+        </p:spPr>
+        <p:style>
+          <a:lnRef idx="1">
+            <a:schemeClr val="accent1"/>
+          </a:lnRef>
+          <a:fillRef idx="0">
+            <a:schemeClr val="accent1"/>
+          </a:fillRef>
+          <a:effectRef idx="0">
+            <a:schemeClr val="accent1"/>
+          </a:effectRef>
+          <a:fontRef idx="minor">
+            <a:schemeClr val="tx1"/>
+          </a:fontRef>
+        </p:style>
+      </p:cxnSp>
+      <p:cxnSp>
+        <p:nvCxnSpPr>
+          <p:cNvPr id="26" name="Straight Connector 25">
+            <a:extLst>
+              <a:ext uri="{FF2B5EF4-FFF2-40B4-BE49-F238E27FC236}">
+                <a16:creationId xmlns:a16="http://schemas.microsoft.com/office/drawing/2014/main" id="{DC0A80FF-F292-EF45-8822-0621F4AEE711}"/>
+              </a:ext>
+            </a:extLst>
+          </p:cNvPr>
+          <p:cNvCxnSpPr>
+            <a:cxnSpLocks/>
+            <a:stCxn id="9" idx="0"/>
+            <a:endCxn id="4" idx="3"/>
+          </p:cNvCxnSpPr>
+          <p:nvPr/>
+        </p:nvCxnSpPr>
+        <p:spPr>
+          <a:xfrm flipH="1" flipV="1">
+            <a:off x="1557250" y="3461302"/>
+            <a:ext cx="5051732" cy="1539174"/>
+          </a:xfrm>
+          <a:prstGeom prst="line">
+            <a:avLst/>
+          </a:prstGeom>
+          <a:ln w="31750">
+            <a:solidFill>
+              <a:schemeClr val="tx1"/>
+            </a:solidFill>
+            <a:prstDash val="dash"/>
+          </a:ln>
+        </p:spPr>
+        <p:style>
+          <a:lnRef idx="1">
+            <a:schemeClr val="accent1"/>
+          </a:lnRef>
+          <a:fillRef idx="0">
+            <a:schemeClr val="accent1"/>
+          </a:fillRef>
+          <a:effectRef idx="0">
+            <a:schemeClr val="accent1"/>
+          </a:effectRef>
+          <a:fontRef idx="minor">
+            <a:schemeClr val="tx1"/>
+          </a:fontRef>
+        </p:style>
+      </p:cxnSp>
+      <p:cxnSp>
+        <p:nvCxnSpPr>
+          <p:cNvPr id="27" name="Straight Connector 26">
+            <a:extLst>
+              <a:ext uri="{FF2B5EF4-FFF2-40B4-BE49-F238E27FC236}">
+                <a16:creationId xmlns:a16="http://schemas.microsoft.com/office/drawing/2014/main" id="{C0540DB8-73F2-0342-AB32-B78FB285EA55}"/>
+              </a:ext>
+            </a:extLst>
+          </p:cNvPr>
+          <p:cNvCxnSpPr>
+            <a:cxnSpLocks/>
+            <a:stCxn id="6" idx="0"/>
+            <a:endCxn id="4" idx="3"/>
+          </p:cNvCxnSpPr>
+          <p:nvPr/>
+        </p:nvCxnSpPr>
+        <p:spPr>
+          <a:xfrm flipH="1" flipV="1">
+            <a:off x="1557250" y="3461302"/>
+            <a:ext cx="235892" cy="1539174"/>
+          </a:xfrm>
+          <a:prstGeom prst="line">
+            <a:avLst/>
+          </a:prstGeom>
+          <a:ln w="31750">
+            <a:solidFill>
+              <a:schemeClr val="tx1"/>
+            </a:solidFill>
+            <a:prstDash val="dash"/>
+          </a:ln>
+        </p:spPr>
+        <p:style>
+          <a:lnRef idx="1">
+            <a:schemeClr val="accent1"/>
+          </a:lnRef>
+          <a:fillRef idx="0">
+            <a:schemeClr val="accent1"/>
+          </a:fillRef>
+          <a:effectRef idx="0">
+            <a:schemeClr val="accent1"/>
+          </a:effectRef>
+          <a:fontRef idx="minor">
+            <a:schemeClr val="tx1"/>
+          </a:fontRef>
+        </p:style>
+      </p:cxnSp>
+    </p:spTree>
+    <p:extLst>
+      <p:ext uri="{BB962C8B-B14F-4D97-AF65-F5344CB8AC3E}">
+        <p14:creationId xmlns:p14="http://schemas.microsoft.com/office/powerpoint/2010/main" val="3081089545"/>
+      </p:ext>
+    </p:extLst>
+  </p:cSld>
+  <p:clrMapOvr>
+    <a:masterClrMapping/>
+  </p:clrMapOvr>
+</p:sld>
+</file>
+
+<file path=ppt/slides/slide61.xml><?xml version="1.0" encoding="utf-8"?>
+<p:sld xmlns:a="http://schemas.openxmlformats.org/drawingml/2006/main" xmlns:r="http://schemas.openxmlformats.org/officeDocument/2006/relationships" xmlns:p="http://schemas.openxmlformats.org/presentationml/2006/main">
+  <p:cSld>
+    <p:spTree>
+      <p:nvGrpSpPr>
+        <p:cNvPr id="1" name=""/>
+        <p:cNvGrpSpPr/>
+        <p:nvPr/>
+      </p:nvGrpSpPr>
+      <p:grpSpPr>
+        <a:xfrm>
+          <a:off x="0" y="0"/>
+          <a:ext cx="0" cy="0"/>
+          <a:chOff x="0" y="0"/>
+          <a:chExt cx="0" cy="0"/>
+        </a:xfrm>
+      </p:grpSpPr>
+      <p:sp>
+        <p:nvSpPr>
+          <p:cNvPr id="2" name="Title 1">
+            <a:extLst>
+              <a:ext uri="{FF2B5EF4-FFF2-40B4-BE49-F238E27FC236}">
+                <a16:creationId xmlns:a16="http://schemas.microsoft.com/office/drawing/2014/main" id="{A44D1E44-047A-9C44-AE10-9D69953403B5}"/>
+              </a:ext>
+            </a:extLst>
+          </p:cNvPr>
+          <p:cNvSpPr>
+            <a:spLocks noGrp="1"/>
+          </p:cNvSpPr>
+          <p:nvPr>
+            <p:ph type="title"/>
+          </p:nvPr>
+        </p:nvSpPr>
+        <p:spPr>
+          <a:xfrm>
+            <a:off x="106825" y="25235"/>
+            <a:ext cx="10515600" cy="945054"/>
+          </a:xfrm>
+        </p:spPr>
+        <p:txBody>
+          <a:bodyPr/>
+          <a:lstStyle/>
+          <a:p>
+            <a:r>
+              <a:rPr lang="en-US" i="1" dirty="0"/>
+              <a:t>microservice/gateway/docker-</a:t>
+            </a:r>
+            <a:r>
+              <a:rPr lang="en-US" i="1" dirty="0" err="1"/>
+              <a:t>compose.yml</a:t>
+            </a:r>
+            <a:endParaRPr lang="en-US" dirty="0"/>
+          </a:p>
+        </p:txBody>
+      </p:sp>
+      <p:sp>
+        <p:nvSpPr>
+          <p:cNvPr id="3" name="Content Placeholder 2">
+            <a:extLst>
+              <a:ext uri="{FF2B5EF4-FFF2-40B4-BE49-F238E27FC236}">
+                <a16:creationId xmlns:a16="http://schemas.microsoft.com/office/drawing/2014/main" id="{179D7F5D-282E-594D-8F9A-55731057BEE1}"/>
+              </a:ext>
+            </a:extLst>
+          </p:cNvPr>
+          <p:cNvSpPr>
+            <a:spLocks noGrp="1"/>
+          </p:cNvSpPr>
+          <p:nvPr>
+            <p:ph idx="1"/>
+          </p:nvPr>
+        </p:nvSpPr>
+        <p:spPr>
+          <a:xfrm>
+            <a:off x="8005593" y="1152629"/>
+            <a:ext cx="4121727" cy="4351338"/>
+          </a:xfrm>
+        </p:spPr>
+        <p:txBody>
+          <a:bodyPr/>
+          <a:lstStyle/>
+          <a:p>
+            <a:r>
+              <a:rPr lang="en-US" dirty="0"/>
+              <a:t>3 instances of same “</a:t>
+            </a:r>
+            <a:r>
+              <a:rPr lang="en-US" i="1" dirty="0"/>
+              <a:t>service”</a:t>
+            </a:r>
+            <a:r>
+              <a:rPr lang="en-US" dirty="0"/>
+              <a:t> accessing a “</a:t>
+            </a:r>
+            <a:r>
+              <a:rPr lang="en-US" i="1" dirty="0"/>
+              <a:t>Postgres” DB</a:t>
+            </a:r>
+          </a:p>
+          <a:p>
+            <a:r>
+              <a:rPr lang="en-US" dirty="0"/>
+              <a:t>A “</a:t>
+            </a:r>
+            <a:r>
+              <a:rPr lang="en-US" i="1" dirty="0"/>
+              <a:t>frontend”</a:t>
+            </a:r>
+            <a:r>
+              <a:rPr lang="en-US" dirty="0"/>
+              <a:t> using such services</a:t>
+            </a:r>
+          </a:p>
+          <a:p>
+            <a:r>
+              <a:rPr lang="en-US" dirty="0"/>
+              <a:t>Load balancing with Eureka/Ribbon</a:t>
+            </a:r>
+          </a:p>
+          <a:p>
+            <a:r>
+              <a:rPr lang="en-US" dirty="0"/>
+              <a:t>All behind a “</a:t>
+            </a:r>
+            <a:r>
+              <a:rPr lang="en-US" i="1" dirty="0"/>
+              <a:t>gateway”</a:t>
+            </a:r>
+          </a:p>
+        </p:txBody>
+      </p:sp>
+      <p:sp>
+        <p:nvSpPr>
+          <p:cNvPr id="4" name="Rounded Rectangle 3">
+            <a:extLst>
+              <a:ext uri="{FF2B5EF4-FFF2-40B4-BE49-F238E27FC236}">
+                <a16:creationId xmlns:a16="http://schemas.microsoft.com/office/drawing/2014/main" id="{3F040019-FA71-E648-9C6F-022A8BA5D0FD}"/>
+              </a:ext>
+            </a:extLst>
+          </p:cNvPr>
+          <p:cNvSpPr/>
+          <p:nvPr/>
+        </p:nvSpPr>
+        <p:spPr>
+          <a:xfrm>
+            <a:off x="106825" y="2723955"/>
+            <a:ext cx="1438100" cy="914400"/>
+          </a:xfrm>
+          <a:prstGeom prst="roundRect">
+            <a:avLst/>
+          </a:prstGeom>
+        </p:spPr>
+        <p:style>
+          <a:lnRef idx="2">
+            <a:schemeClr val="accent1">
+              <a:shade val="50000"/>
+            </a:schemeClr>
+          </a:lnRef>
+          <a:fillRef idx="1">
+            <a:schemeClr val="accent1"/>
+          </a:fillRef>
+          <a:effectRef idx="0">
+            <a:schemeClr val="accent1"/>
+          </a:effectRef>
+          <a:fontRef idx="minor">
+            <a:schemeClr val="lt1"/>
+          </a:fontRef>
+        </p:style>
+        <p:txBody>
+          <a:bodyPr rtlCol="0" anchor="ctr"/>
+          <a:lstStyle/>
+          <a:p>
+            <a:pPr algn="ctr"/>
+            <a:r>
+              <a:rPr lang="en-US" sz="2800" dirty="0">
+                <a:solidFill>
+                  <a:schemeClr val="tx1"/>
+                </a:solidFill>
+              </a:rPr>
+              <a:t>Eureka</a:t>
+            </a:r>
+          </a:p>
+        </p:txBody>
+      </p:sp>
+      <p:sp>
+        <p:nvSpPr>
+          <p:cNvPr id="5" name="Rounded Rectangle 4">
+            <a:extLst>
+              <a:ext uri="{FF2B5EF4-FFF2-40B4-BE49-F238E27FC236}">
+                <a16:creationId xmlns:a16="http://schemas.microsoft.com/office/drawing/2014/main" id="{CC4CFBF8-56EC-E445-898E-55C71A3B39F2}"/>
+              </a:ext>
+            </a:extLst>
+          </p:cNvPr>
+          <p:cNvSpPr/>
+          <p:nvPr/>
+        </p:nvSpPr>
+        <p:spPr>
+          <a:xfrm>
+            <a:off x="3189753" y="1809555"/>
+            <a:ext cx="1961950" cy="914400"/>
+          </a:xfrm>
+          <a:prstGeom prst="roundRect">
+            <a:avLst/>
+          </a:prstGeom>
+          <a:solidFill>
+            <a:schemeClr val="accent4"/>
+          </a:solidFill>
+        </p:spPr>
+        <p:style>
+          <a:lnRef idx="2">
+            <a:schemeClr val="accent1">
+              <a:shade val="50000"/>
+            </a:schemeClr>
+          </a:lnRef>
+          <a:fillRef idx="1">
+            <a:schemeClr val="accent1"/>
+          </a:fillRef>
+          <a:effectRef idx="0">
+            <a:schemeClr val="accent1"/>
+          </a:effectRef>
+          <a:fontRef idx="minor">
+            <a:schemeClr val="lt1"/>
+          </a:fontRef>
+        </p:style>
+        <p:txBody>
+          <a:bodyPr rtlCol="0" anchor="ctr"/>
+          <a:lstStyle/>
+          <a:p>
+            <a:pPr algn="ctr"/>
+            <a:r>
+              <a:rPr lang="en-US" sz="2800" dirty="0">
+                <a:solidFill>
+                  <a:schemeClr val="tx1"/>
+                </a:solidFill>
+              </a:rPr>
+              <a:t>Gateway</a:t>
+            </a:r>
+          </a:p>
+        </p:txBody>
+      </p:sp>
+      <p:sp>
+        <p:nvSpPr>
+          <p:cNvPr id="6" name="Rounded Rectangle 5">
+            <a:extLst>
+              <a:ext uri="{FF2B5EF4-FFF2-40B4-BE49-F238E27FC236}">
+                <a16:creationId xmlns:a16="http://schemas.microsoft.com/office/drawing/2014/main" id="{BF2FA109-30C2-3A46-B76D-1A43235C55FF}"/>
+              </a:ext>
+            </a:extLst>
+          </p:cNvPr>
+          <p:cNvSpPr/>
+          <p:nvPr/>
+        </p:nvSpPr>
+        <p:spPr>
+          <a:xfrm>
+            <a:off x="781833" y="4690605"/>
+            <a:ext cx="2005992" cy="629540"/>
+          </a:xfrm>
+          <a:prstGeom prst="roundRect">
+            <a:avLst/>
+          </a:prstGeom>
+          <a:solidFill>
+            <a:schemeClr val="bg2">
+              <a:lumMod val="50000"/>
+            </a:schemeClr>
+          </a:solidFill>
+        </p:spPr>
+        <p:style>
+          <a:lnRef idx="2">
+            <a:schemeClr val="accent1">
+              <a:shade val="50000"/>
+            </a:schemeClr>
+          </a:lnRef>
+          <a:fillRef idx="1">
+            <a:schemeClr val="accent1"/>
+          </a:fillRef>
+          <a:effectRef idx="0">
+            <a:schemeClr val="accent1"/>
+          </a:effectRef>
+          <a:fontRef idx="minor">
+            <a:schemeClr val="lt1"/>
+          </a:fontRef>
+        </p:style>
+        <p:txBody>
+          <a:bodyPr rtlCol="0" anchor="ctr"/>
+          <a:lstStyle/>
+          <a:p>
+            <a:pPr algn="ctr"/>
+            <a:r>
+              <a:rPr lang="en-US" sz="2800" dirty="0">
+                <a:solidFill>
+                  <a:schemeClr val="tx1"/>
+                </a:solidFill>
+              </a:rPr>
+              <a:t>Service A</a:t>
+            </a:r>
+          </a:p>
+        </p:txBody>
+      </p:sp>
+      <p:sp>
+        <p:nvSpPr>
+          <p:cNvPr id="7" name="Rounded Rectangle 6">
+            <a:extLst>
+              <a:ext uri="{FF2B5EF4-FFF2-40B4-BE49-F238E27FC236}">
+                <a16:creationId xmlns:a16="http://schemas.microsoft.com/office/drawing/2014/main" id="{636F3476-687F-384B-AA5C-C19679BE584F}"/>
+              </a:ext>
+            </a:extLst>
+          </p:cNvPr>
+          <p:cNvSpPr/>
+          <p:nvPr/>
+        </p:nvSpPr>
+        <p:spPr>
+          <a:xfrm>
+            <a:off x="3189753" y="4690605"/>
+            <a:ext cx="2005992" cy="629540"/>
+          </a:xfrm>
+          <a:prstGeom prst="roundRect">
+            <a:avLst/>
+          </a:prstGeom>
+          <a:solidFill>
+            <a:schemeClr val="bg2">
+              <a:lumMod val="50000"/>
+            </a:schemeClr>
+          </a:solidFill>
+        </p:spPr>
+        <p:style>
+          <a:lnRef idx="2">
+            <a:schemeClr val="accent1">
+              <a:shade val="50000"/>
+            </a:schemeClr>
+          </a:lnRef>
+          <a:fillRef idx="1">
+            <a:schemeClr val="accent1"/>
+          </a:fillRef>
+          <a:effectRef idx="0">
+            <a:schemeClr val="accent1"/>
+          </a:effectRef>
+          <a:fontRef idx="minor">
+            <a:schemeClr val="lt1"/>
+          </a:fontRef>
+        </p:style>
+        <p:txBody>
+          <a:bodyPr rtlCol="0" anchor="ctr"/>
+          <a:lstStyle/>
+          <a:p>
+            <a:pPr algn="ctr"/>
+            <a:r>
+              <a:rPr lang="en-US" sz="2800" dirty="0">
+                <a:solidFill>
+                  <a:schemeClr val="tx1"/>
+                </a:solidFill>
+              </a:rPr>
+              <a:t>Service B</a:t>
+            </a:r>
+          </a:p>
+        </p:txBody>
+      </p:sp>
+      <p:sp>
+        <p:nvSpPr>
+          <p:cNvPr id="8" name="Rounded Rectangle 7">
+            <a:extLst>
+              <a:ext uri="{FF2B5EF4-FFF2-40B4-BE49-F238E27FC236}">
+                <a16:creationId xmlns:a16="http://schemas.microsoft.com/office/drawing/2014/main" id="{E351F11E-0B64-834E-913F-1D4FA2E278B1}"/>
+              </a:ext>
+            </a:extLst>
+          </p:cNvPr>
+          <p:cNvSpPr/>
+          <p:nvPr/>
+        </p:nvSpPr>
+        <p:spPr>
+          <a:xfrm>
+            <a:off x="5597673" y="4690605"/>
+            <a:ext cx="2005992" cy="629540"/>
+          </a:xfrm>
+          <a:prstGeom prst="roundRect">
+            <a:avLst/>
+          </a:prstGeom>
+          <a:solidFill>
+            <a:schemeClr val="bg2">
+              <a:lumMod val="50000"/>
+            </a:schemeClr>
+          </a:solidFill>
+        </p:spPr>
+        <p:style>
+          <a:lnRef idx="2">
+            <a:schemeClr val="accent1">
+              <a:shade val="50000"/>
+            </a:schemeClr>
+          </a:lnRef>
+          <a:fillRef idx="1">
+            <a:schemeClr val="accent1"/>
+          </a:fillRef>
+          <a:effectRef idx="0">
+            <a:schemeClr val="accent1"/>
+          </a:effectRef>
+          <a:fontRef idx="minor">
+            <a:schemeClr val="lt1"/>
+          </a:fontRef>
+        </p:style>
+        <p:txBody>
+          <a:bodyPr rtlCol="0" anchor="ctr"/>
+          <a:lstStyle/>
+          <a:p>
+            <a:pPr algn="ctr"/>
+            <a:r>
+              <a:rPr lang="en-US" sz="2800" dirty="0">
+                <a:solidFill>
+                  <a:schemeClr val="tx1"/>
+                </a:solidFill>
+              </a:rPr>
+              <a:t>Service C</a:t>
+            </a:r>
+          </a:p>
+        </p:txBody>
+      </p:sp>
+      <p:cxnSp>
+        <p:nvCxnSpPr>
+          <p:cNvPr id="9" name="Straight Arrow Connector 8">
+            <a:extLst>
+              <a:ext uri="{FF2B5EF4-FFF2-40B4-BE49-F238E27FC236}">
+                <a16:creationId xmlns:a16="http://schemas.microsoft.com/office/drawing/2014/main" id="{60076EC1-1825-6143-8832-CD9B17E5B98E}"/>
+              </a:ext>
+            </a:extLst>
+          </p:cNvPr>
+          <p:cNvCxnSpPr>
+            <a:cxnSpLocks/>
+            <a:stCxn id="5" idx="2"/>
+            <a:endCxn id="7" idx="0"/>
+          </p:cNvCxnSpPr>
+          <p:nvPr/>
+        </p:nvCxnSpPr>
+        <p:spPr>
+          <a:xfrm>
+            <a:off x="4170728" y="2723955"/>
+            <a:ext cx="22021" cy="1966650"/>
+          </a:xfrm>
+          <a:prstGeom prst="straightConnector1">
+            <a:avLst/>
+          </a:prstGeom>
+          <a:ln w="63500">
+            <a:solidFill>
+              <a:schemeClr val="tx1"/>
+            </a:solidFill>
+            <a:tailEnd type="triangle"/>
+          </a:ln>
+        </p:spPr>
+        <p:style>
+          <a:lnRef idx="1">
+            <a:schemeClr val="accent1"/>
+          </a:lnRef>
+          <a:fillRef idx="0">
+            <a:schemeClr val="accent1"/>
+          </a:fillRef>
+          <a:effectRef idx="0">
+            <a:schemeClr val="accent1"/>
+          </a:effectRef>
+          <a:fontRef idx="minor">
+            <a:schemeClr val="tx1"/>
+          </a:fontRef>
+        </p:style>
+      </p:cxnSp>
+      <p:cxnSp>
+        <p:nvCxnSpPr>
+          <p:cNvPr id="10" name="Straight Arrow Connector 9">
+            <a:extLst>
+              <a:ext uri="{FF2B5EF4-FFF2-40B4-BE49-F238E27FC236}">
+                <a16:creationId xmlns:a16="http://schemas.microsoft.com/office/drawing/2014/main" id="{C5276FCF-AC28-9244-B4D1-DD504AFA5310}"/>
+              </a:ext>
+            </a:extLst>
+          </p:cNvPr>
+          <p:cNvCxnSpPr>
+            <a:cxnSpLocks/>
+            <a:stCxn id="5" idx="2"/>
+            <a:endCxn id="6" idx="0"/>
+          </p:cNvCxnSpPr>
+          <p:nvPr/>
+        </p:nvCxnSpPr>
+        <p:spPr>
+          <a:xfrm flipH="1">
+            <a:off x="1784829" y="2723955"/>
+            <a:ext cx="2385899" cy="1966650"/>
+          </a:xfrm>
+          <a:prstGeom prst="straightConnector1">
+            <a:avLst/>
+          </a:prstGeom>
+          <a:ln w="63500">
+            <a:solidFill>
+              <a:schemeClr val="tx1"/>
+            </a:solidFill>
+            <a:tailEnd type="triangle"/>
+          </a:ln>
+        </p:spPr>
+        <p:style>
+          <a:lnRef idx="1">
+            <a:schemeClr val="accent1"/>
+          </a:lnRef>
+          <a:fillRef idx="0">
+            <a:schemeClr val="accent1"/>
+          </a:fillRef>
+          <a:effectRef idx="0">
+            <a:schemeClr val="accent1"/>
+          </a:effectRef>
+          <a:fontRef idx="minor">
+            <a:schemeClr val="tx1"/>
+          </a:fontRef>
+        </p:style>
+      </p:cxnSp>
+      <p:cxnSp>
+        <p:nvCxnSpPr>
+          <p:cNvPr id="11" name="Straight Arrow Connector 10">
+            <a:extLst>
+              <a:ext uri="{FF2B5EF4-FFF2-40B4-BE49-F238E27FC236}">
+                <a16:creationId xmlns:a16="http://schemas.microsoft.com/office/drawing/2014/main" id="{C7101C2A-B3B2-8241-8E91-8B44C95530D0}"/>
+              </a:ext>
+            </a:extLst>
+          </p:cNvPr>
+          <p:cNvCxnSpPr>
+            <a:cxnSpLocks/>
+            <a:stCxn id="5" idx="2"/>
+            <a:endCxn id="8" idx="0"/>
+          </p:cNvCxnSpPr>
+          <p:nvPr/>
+        </p:nvCxnSpPr>
+        <p:spPr>
+          <a:xfrm>
+            <a:off x="4170728" y="2723955"/>
+            <a:ext cx="2429941" cy="1966650"/>
+          </a:xfrm>
+          <a:prstGeom prst="straightConnector1">
+            <a:avLst/>
+          </a:prstGeom>
+          <a:ln w="63500">
+            <a:solidFill>
+              <a:schemeClr val="tx1"/>
+            </a:solidFill>
+            <a:tailEnd type="triangle"/>
+          </a:ln>
+        </p:spPr>
+        <p:style>
+          <a:lnRef idx="1">
+            <a:schemeClr val="accent1"/>
+          </a:lnRef>
+          <a:fillRef idx="0">
+            <a:schemeClr val="accent1"/>
+          </a:fillRef>
+          <a:effectRef idx="0">
+            <a:schemeClr val="accent1"/>
+          </a:effectRef>
+          <a:fontRef idx="minor">
+            <a:schemeClr val="tx1"/>
+          </a:fontRef>
+        </p:style>
+      </p:cxnSp>
+      <p:cxnSp>
+        <p:nvCxnSpPr>
+          <p:cNvPr id="12" name="Straight Connector 11">
+            <a:extLst>
+              <a:ext uri="{FF2B5EF4-FFF2-40B4-BE49-F238E27FC236}">
+                <a16:creationId xmlns:a16="http://schemas.microsoft.com/office/drawing/2014/main" id="{48CCFFF6-D659-6C4C-B365-38AFDF502B23}"/>
+              </a:ext>
+            </a:extLst>
+          </p:cNvPr>
+          <p:cNvCxnSpPr>
+            <a:cxnSpLocks/>
+            <a:stCxn id="5" idx="1"/>
+            <a:endCxn id="4" idx="3"/>
+          </p:cNvCxnSpPr>
+          <p:nvPr/>
+        </p:nvCxnSpPr>
+        <p:spPr>
+          <a:xfrm flipH="1">
+            <a:off x="1544925" y="2266755"/>
+            <a:ext cx="1644828" cy="914400"/>
+          </a:xfrm>
+          <a:prstGeom prst="line">
+            <a:avLst/>
+          </a:prstGeom>
+          <a:ln w="31750">
+            <a:solidFill>
+              <a:schemeClr val="tx1"/>
+            </a:solidFill>
+            <a:prstDash val="dash"/>
+          </a:ln>
+        </p:spPr>
+        <p:style>
+          <a:lnRef idx="1">
+            <a:schemeClr val="accent1"/>
+          </a:lnRef>
+          <a:fillRef idx="0">
+            <a:schemeClr val="accent1"/>
+          </a:fillRef>
+          <a:effectRef idx="0">
+            <a:schemeClr val="accent1"/>
+          </a:effectRef>
+          <a:fontRef idx="minor">
+            <a:schemeClr val="tx1"/>
+          </a:fontRef>
+        </p:style>
+      </p:cxnSp>
+      <p:cxnSp>
+        <p:nvCxnSpPr>
+          <p:cNvPr id="13" name="Straight Connector 12">
+            <a:extLst>
+              <a:ext uri="{FF2B5EF4-FFF2-40B4-BE49-F238E27FC236}">
+                <a16:creationId xmlns:a16="http://schemas.microsoft.com/office/drawing/2014/main" id="{C039D141-F540-9F42-95C7-50F8DDABDC6E}"/>
+              </a:ext>
+            </a:extLst>
+          </p:cNvPr>
+          <p:cNvCxnSpPr>
+            <a:cxnSpLocks/>
+            <a:stCxn id="7" idx="0"/>
+            <a:endCxn id="4" idx="3"/>
+          </p:cNvCxnSpPr>
+          <p:nvPr/>
+        </p:nvCxnSpPr>
+        <p:spPr>
+          <a:xfrm flipH="1" flipV="1">
+            <a:off x="1544925" y="3181155"/>
+            <a:ext cx="2647824" cy="1509450"/>
+          </a:xfrm>
+          <a:prstGeom prst="line">
+            <a:avLst/>
+          </a:prstGeom>
+          <a:ln w="31750">
+            <a:solidFill>
+              <a:schemeClr val="tx1"/>
+            </a:solidFill>
+            <a:prstDash val="dash"/>
+          </a:ln>
+        </p:spPr>
+        <p:style>
+          <a:lnRef idx="1">
+            <a:schemeClr val="accent1"/>
+          </a:lnRef>
+          <a:fillRef idx="0">
+            <a:schemeClr val="accent1"/>
+          </a:fillRef>
+          <a:effectRef idx="0">
+            <a:schemeClr val="accent1"/>
+          </a:effectRef>
+          <a:fontRef idx="minor">
+            <a:schemeClr val="tx1"/>
+          </a:fontRef>
+        </p:style>
+      </p:cxnSp>
+      <p:cxnSp>
+        <p:nvCxnSpPr>
+          <p:cNvPr id="14" name="Straight Connector 13">
+            <a:extLst>
+              <a:ext uri="{FF2B5EF4-FFF2-40B4-BE49-F238E27FC236}">
+                <a16:creationId xmlns:a16="http://schemas.microsoft.com/office/drawing/2014/main" id="{25B36E10-2321-904C-B9B3-77B7F013185E}"/>
+              </a:ext>
+            </a:extLst>
+          </p:cNvPr>
+          <p:cNvCxnSpPr>
+            <a:cxnSpLocks/>
+            <a:stCxn id="8" idx="0"/>
+            <a:endCxn id="4" idx="3"/>
+          </p:cNvCxnSpPr>
+          <p:nvPr/>
+        </p:nvCxnSpPr>
+        <p:spPr>
+          <a:xfrm flipH="1" flipV="1">
+            <a:off x="1544925" y="3181155"/>
+            <a:ext cx="5055744" cy="1509450"/>
+          </a:xfrm>
+          <a:prstGeom prst="line">
+            <a:avLst/>
+          </a:prstGeom>
+          <a:ln w="31750">
+            <a:solidFill>
+              <a:schemeClr val="tx1"/>
+            </a:solidFill>
+            <a:prstDash val="dash"/>
+          </a:ln>
+        </p:spPr>
+        <p:style>
+          <a:lnRef idx="1">
+            <a:schemeClr val="accent1"/>
+          </a:lnRef>
+          <a:fillRef idx="0">
+            <a:schemeClr val="accent1"/>
+          </a:fillRef>
+          <a:effectRef idx="0">
+            <a:schemeClr val="accent1"/>
+          </a:effectRef>
+          <a:fontRef idx="minor">
+            <a:schemeClr val="tx1"/>
+          </a:fontRef>
+        </p:style>
+      </p:cxnSp>
+      <p:cxnSp>
+        <p:nvCxnSpPr>
+          <p:cNvPr id="15" name="Straight Connector 14">
+            <a:extLst>
+              <a:ext uri="{FF2B5EF4-FFF2-40B4-BE49-F238E27FC236}">
+                <a16:creationId xmlns:a16="http://schemas.microsoft.com/office/drawing/2014/main" id="{9322AA90-E5F6-BB48-9890-B23B0D062259}"/>
+              </a:ext>
+            </a:extLst>
+          </p:cNvPr>
+          <p:cNvCxnSpPr>
+            <a:cxnSpLocks/>
+            <a:stCxn id="6" idx="0"/>
+            <a:endCxn id="4" idx="3"/>
+          </p:cNvCxnSpPr>
+          <p:nvPr/>
+        </p:nvCxnSpPr>
+        <p:spPr>
+          <a:xfrm flipH="1" flipV="1">
+            <a:off x="1544925" y="3181155"/>
+            <a:ext cx="239904" cy="1509450"/>
+          </a:xfrm>
+          <a:prstGeom prst="line">
+            <a:avLst/>
+          </a:prstGeom>
+          <a:ln w="31750">
+            <a:solidFill>
+              <a:schemeClr val="tx1"/>
+            </a:solidFill>
+            <a:prstDash val="dash"/>
+          </a:ln>
+        </p:spPr>
+        <p:style>
+          <a:lnRef idx="1">
+            <a:schemeClr val="accent1"/>
+          </a:lnRef>
+          <a:fillRef idx="0">
+            <a:schemeClr val="accent1"/>
+          </a:fillRef>
+          <a:effectRef idx="0">
+            <a:schemeClr val="accent1"/>
+          </a:effectRef>
+          <a:fontRef idx="minor">
+            <a:schemeClr val="tx1"/>
+          </a:fontRef>
+        </p:style>
+      </p:cxnSp>
+      <p:sp>
+        <p:nvSpPr>
+          <p:cNvPr id="24" name="Rounded Rectangle 23">
+            <a:extLst>
+              <a:ext uri="{FF2B5EF4-FFF2-40B4-BE49-F238E27FC236}">
+                <a16:creationId xmlns:a16="http://schemas.microsoft.com/office/drawing/2014/main" id="{1B9E35CA-CB90-E541-9CEB-FFF3E12F4799}"/>
+              </a:ext>
+            </a:extLst>
+          </p:cNvPr>
+          <p:cNvSpPr/>
+          <p:nvPr/>
+        </p:nvSpPr>
+        <p:spPr>
+          <a:xfrm>
+            <a:off x="5918662" y="3127812"/>
+            <a:ext cx="1685003" cy="914400"/>
+          </a:xfrm>
+          <a:prstGeom prst="roundRect">
+            <a:avLst/>
+          </a:prstGeom>
+          <a:solidFill>
+            <a:schemeClr val="accent1">
+              <a:lumMod val="40000"/>
+              <a:lumOff val="60000"/>
+            </a:schemeClr>
+          </a:solidFill>
+        </p:spPr>
+        <p:style>
+          <a:lnRef idx="2">
+            <a:schemeClr val="accent1">
+              <a:shade val="50000"/>
+            </a:schemeClr>
+          </a:lnRef>
+          <a:fillRef idx="1">
+            <a:schemeClr val="accent1"/>
+          </a:fillRef>
+          <a:effectRef idx="0">
+            <a:schemeClr val="accent1"/>
+          </a:effectRef>
+          <a:fontRef idx="minor">
+            <a:schemeClr val="lt1"/>
+          </a:fontRef>
+        </p:style>
+        <p:txBody>
+          <a:bodyPr rtlCol="0" anchor="ctr"/>
+          <a:lstStyle/>
+          <a:p>
+            <a:pPr algn="ctr"/>
+            <a:r>
+              <a:rPr lang="en-US" sz="2800" dirty="0">
+                <a:solidFill>
+                  <a:schemeClr val="tx1"/>
+                </a:solidFill>
+              </a:rPr>
+              <a:t>Frontend</a:t>
+            </a:r>
+          </a:p>
+        </p:txBody>
+      </p:sp>
+      <p:cxnSp>
+        <p:nvCxnSpPr>
+          <p:cNvPr id="25" name="Straight Arrow Connector 24">
+            <a:extLst>
+              <a:ext uri="{FF2B5EF4-FFF2-40B4-BE49-F238E27FC236}">
+                <a16:creationId xmlns:a16="http://schemas.microsoft.com/office/drawing/2014/main" id="{886B094E-FF66-4F42-A3A4-A96CC75E6AD9}"/>
+              </a:ext>
+            </a:extLst>
+          </p:cNvPr>
+          <p:cNvCxnSpPr>
+            <a:cxnSpLocks/>
+            <a:stCxn id="5" idx="2"/>
+            <a:endCxn id="24" idx="1"/>
+          </p:cNvCxnSpPr>
+          <p:nvPr/>
+        </p:nvCxnSpPr>
+        <p:spPr>
+          <a:xfrm>
+            <a:off x="4170728" y="2723955"/>
+            <a:ext cx="1747934" cy="861057"/>
+          </a:xfrm>
+          <a:prstGeom prst="straightConnector1">
+            <a:avLst/>
+          </a:prstGeom>
+          <a:ln w="63500">
+            <a:solidFill>
+              <a:schemeClr val="tx1"/>
+            </a:solidFill>
+            <a:tailEnd type="triangle"/>
+          </a:ln>
+        </p:spPr>
+        <p:style>
+          <a:lnRef idx="1">
+            <a:schemeClr val="accent1"/>
+          </a:lnRef>
+          <a:fillRef idx="0">
+            <a:schemeClr val="accent1"/>
+          </a:fillRef>
+          <a:effectRef idx="0">
+            <a:schemeClr val="accent1"/>
+          </a:effectRef>
+          <a:fontRef idx="minor">
+            <a:schemeClr val="tx1"/>
+          </a:fontRef>
+        </p:style>
+      </p:cxnSp>
+      <p:sp>
+        <p:nvSpPr>
+          <p:cNvPr id="29" name="Down Arrow 28">
+            <a:extLst>
+              <a:ext uri="{FF2B5EF4-FFF2-40B4-BE49-F238E27FC236}">
+                <a16:creationId xmlns:a16="http://schemas.microsoft.com/office/drawing/2014/main" id="{10CEFFA0-827D-6E43-BB84-4F31E6AD2D6C}"/>
+              </a:ext>
+            </a:extLst>
+          </p:cNvPr>
+          <p:cNvSpPr/>
+          <p:nvPr/>
+        </p:nvSpPr>
+        <p:spPr>
+          <a:xfrm>
+            <a:off x="3928412" y="970289"/>
+            <a:ext cx="484632" cy="762574"/>
+          </a:xfrm>
+          <a:prstGeom prst="downArrow">
+            <a:avLst/>
+          </a:prstGeom>
+        </p:spPr>
+        <p:style>
+          <a:lnRef idx="2">
+            <a:schemeClr val="accent1">
+              <a:shade val="50000"/>
+            </a:schemeClr>
+          </a:lnRef>
+          <a:fillRef idx="1">
+            <a:schemeClr val="accent1"/>
+          </a:fillRef>
+          <a:effectRef idx="0">
+            <a:schemeClr val="accent1"/>
+          </a:effectRef>
+          <a:fontRef idx="minor">
+            <a:schemeClr val="lt1"/>
+          </a:fontRef>
+        </p:style>
+        <p:txBody>
+          <a:bodyPr rtlCol="0" anchor="ctr"/>
+          <a:lstStyle/>
+          <a:p>
+            <a:pPr algn="ctr"/>
+            <a:endParaRPr lang="en-US"/>
+          </a:p>
+        </p:txBody>
+      </p:sp>
+      <p:sp>
+        <p:nvSpPr>
+          <p:cNvPr id="41" name="Rounded Rectangle 40">
+            <a:extLst>
+              <a:ext uri="{FF2B5EF4-FFF2-40B4-BE49-F238E27FC236}">
+                <a16:creationId xmlns:a16="http://schemas.microsoft.com/office/drawing/2014/main" id="{0C875A8F-8350-884D-9AEC-C32F970AF130}"/>
+              </a:ext>
+            </a:extLst>
+          </p:cNvPr>
+          <p:cNvSpPr/>
+          <p:nvPr/>
+        </p:nvSpPr>
+        <p:spPr>
+          <a:xfrm>
+            <a:off x="3211774" y="6132315"/>
+            <a:ext cx="1961949" cy="623912"/>
+          </a:xfrm>
+          <a:prstGeom prst="roundRect">
+            <a:avLst/>
+          </a:prstGeom>
+          <a:solidFill>
+            <a:schemeClr val="accent6"/>
+          </a:solidFill>
+        </p:spPr>
+        <p:style>
+          <a:lnRef idx="2">
+            <a:schemeClr val="accent1">
+              <a:shade val="50000"/>
+            </a:schemeClr>
+          </a:lnRef>
+          <a:fillRef idx="1">
+            <a:schemeClr val="accent1"/>
+          </a:fillRef>
+          <a:effectRef idx="0">
+            <a:schemeClr val="accent1"/>
+          </a:effectRef>
+          <a:fontRef idx="minor">
+            <a:schemeClr val="lt1"/>
+          </a:fontRef>
+        </p:style>
+        <p:txBody>
+          <a:bodyPr rtlCol="0" anchor="ctr"/>
+          <a:lstStyle/>
+          <a:p>
+            <a:pPr algn="ctr"/>
+            <a:r>
+              <a:rPr lang="en-US" sz="2800" dirty="0">
+                <a:solidFill>
+                  <a:schemeClr val="tx1"/>
+                </a:solidFill>
+              </a:rPr>
+              <a:t>Postgres</a:t>
+            </a:r>
+          </a:p>
+        </p:txBody>
+      </p:sp>
+      <p:cxnSp>
+        <p:nvCxnSpPr>
+          <p:cNvPr id="48" name="Straight Arrow Connector 47">
+            <a:extLst>
+              <a:ext uri="{FF2B5EF4-FFF2-40B4-BE49-F238E27FC236}">
+                <a16:creationId xmlns:a16="http://schemas.microsoft.com/office/drawing/2014/main" id="{5766A286-C80F-A845-BAC5-D7B3723A4147}"/>
+              </a:ext>
+            </a:extLst>
+          </p:cNvPr>
+          <p:cNvCxnSpPr>
+            <a:cxnSpLocks/>
+            <a:stCxn id="6" idx="2"/>
+            <a:endCxn id="41" idx="1"/>
+          </p:cNvCxnSpPr>
+          <p:nvPr/>
+        </p:nvCxnSpPr>
+        <p:spPr>
+          <a:xfrm>
+            <a:off x="1784829" y="5320145"/>
+            <a:ext cx="1426945" cy="1124126"/>
+          </a:xfrm>
+          <a:prstGeom prst="straightConnector1">
+            <a:avLst/>
+          </a:prstGeom>
+          <a:ln w="63500">
+            <a:solidFill>
+              <a:schemeClr val="tx1"/>
+            </a:solidFill>
+            <a:tailEnd type="triangle"/>
+          </a:ln>
+        </p:spPr>
+        <p:style>
+          <a:lnRef idx="1">
+            <a:schemeClr val="accent1"/>
+          </a:lnRef>
+          <a:fillRef idx="0">
+            <a:schemeClr val="accent1"/>
+          </a:fillRef>
+          <a:effectRef idx="0">
+            <a:schemeClr val="accent1"/>
+          </a:effectRef>
+          <a:fontRef idx="minor">
+            <a:schemeClr val="tx1"/>
+          </a:fontRef>
+        </p:style>
+      </p:cxnSp>
+      <p:cxnSp>
+        <p:nvCxnSpPr>
+          <p:cNvPr id="53" name="Straight Arrow Connector 52">
+            <a:extLst>
+              <a:ext uri="{FF2B5EF4-FFF2-40B4-BE49-F238E27FC236}">
+                <a16:creationId xmlns:a16="http://schemas.microsoft.com/office/drawing/2014/main" id="{D933BF8C-B934-9D4F-8672-DEDBD95FC304}"/>
+              </a:ext>
+            </a:extLst>
+          </p:cNvPr>
+          <p:cNvCxnSpPr>
+            <a:cxnSpLocks/>
+            <a:stCxn id="7" idx="2"/>
+            <a:endCxn id="41" idx="0"/>
+          </p:cNvCxnSpPr>
+          <p:nvPr/>
+        </p:nvCxnSpPr>
+        <p:spPr>
+          <a:xfrm>
+            <a:off x="4192749" y="5320145"/>
+            <a:ext cx="0" cy="812170"/>
+          </a:xfrm>
+          <a:prstGeom prst="straightConnector1">
+            <a:avLst/>
+          </a:prstGeom>
+          <a:ln w="63500">
+            <a:solidFill>
+              <a:schemeClr val="tx1"/>
+            </a:solidFill>
+            <a:tailEnd type="triangle"/>
+          </a:ln>
+        </p:spPr>
+        <p:style>
+          <a:lnRef idx="1">
+            <a:schemeClr val="accent1"/>
+          </a:lnRef>
+          <a:fillRef idx="0">
+            <a:schemeClr val="accent1"/>
+          </a:fillRef>
+          <a:effectRef idx="0">
+            <a:schemeClr val="accent1"/>
+          </a:effectRef>
+          <a:fontRef idx="minor">
+            <a:schemeClr val="tx1"/>
+          </a:fontRef>
+        </p:style>
+      </p:cxnSp>
+      <p:cxnSp>
+        <p:nvCxnSpPr>
+          <p:cNvPr id="56" name="Straight Arrow Connector 55">
+            <a:extLst>
+              <a:ext uri="{FF2B5EF4-FFF2-40B4-BE49-F238E27FC236}">
+                <a16:creationId xmlns:a16="http://schemas.microsoft.com/office/drawing/2014/main" id="{74B0ED02-C31A-B44E-AC70-A51830DAF6A8}"/>
+              </a:ext>
+            </a:extLst>
+          </p:cNvPr>
+          <p:cNvCxnSpPr>
+            <a:cxnSpLocks/>
+            <a:stCxn id="8" idx="2"/>
+            <a:endCxn id="41" idx="3"/>
+          </p:cNvCxnSpPr>
+          <p:nvPr/>
+        </p:nvCxnSpPr>
+        <p:spPr>
+          <a:xfrm flipH="1">
+            <a:off x="5173723" y="5320145"/>
+            <a:ext cx="1426946" cy="1124126"/>
+          </a:xfrm>
+          <a:prstGeom prst="straightConnector1">
+            <a:avLst/>
+          </a:prstGeom>
+          <a:ln w="63500">
+            <a:solidFill>
+              <a:schemeClr val="tx1"/>
+            </a:solidFill>
+            <a:tailEnd type="triangle"/>
+          </a:ln>
+        </p:spPr>
+        <p:style>
+          <a:lnRef idx="1">
+            <a:schemeClr val="accent1"/>
+          </a:lnRef>
+          <a:fillRef idx="0">
+            <a:schemeClr val="accent1"/>
+          </a:fillRef>
+          <a:effectRef idx="0">
+            <a:schemeClr val="accent1"/>
+          </a:effectRef>
+          <a:fontRef idx="minor">
+            <a:schemeClr val="tx1"/>
+          </a:fontRef>
+        </p:style>
+      </p:cxnSp>
+    </p:spTree>
+    <p:extLst>
+      <p:ext uri="{BB962C8B-B14F-4D97-AF65-F5344CB8AC3E}">
+        <p14:creationId xmlns:p14="http://schemas.microsoft.com/office/powerpoint/2010/main" val="3433183272"/>
+      </p:ext>
+    </p:extLst>
+  </p:cSld>
+  <p:clrMapOvr>
+    <a:masterClrMapping/>
+  </p:clrMapOvr>
+</p:sld>
+</file>
+
+<file path=ppt/slides/slide62.xml><?xml version="1.0" encoding="utf-8"?>
+<p:sld xmlns:a="http://schemas.openxmlformats.org/drawingml/2006/main" xmlns:r="http://schemas.openxmlformats.org/officeDocument/2006/relationships" xmlns:p="http://schemas.openxmlformats.org/presentationml/2006/main">
+  <p:cSld>
+    <p:spTree>
+      <p:nvGrpSpPr>
+        <p:cNvPr id="1" name=""/>
+        <p:cNvGrpSpPr/>
+        <p:nvPr/>
+      </p:nvGrpSpPr>
+      <p:grpSpPr>
+        <a:xfrm>
+          <a:off x="0" y="0"/>
+          <a:ext cx="0" cy="0"/>
+          <a:chOff x="0" y="0"/>
+          <a:chExt cx="0" cy="0"/>
+        </a:xfrm>
+      </p:grpSpPr>
+      <p:sp>
+        <p:nvSpPr>
+          <p:cNvPr id="2" name="Title 1"/>
+          <p:cNvSpPr>
+            <a:spLocks noGrp="1"/>
+          </p:cNvSpPr>
+          <p:nvPr>
+            <p:ph type="title"/>
+          </p:nvPr>
+        </p:nvSpPr>
+        <p:spPr/>
+        <p:txBody>
+          <a:bodyPr/>
+          <a:lstStyle/>
+          <a:p>
+            <a:r>
+              <a:rPr lang="en-US" sz="6600" dirty="0"/>
+              <a:t>Conclusion</a:t>
+            </a:r>
+            <a:endParaRPr lang="en-US" dirty="0"/>
+          </a:p>
+        </p:txBody>
+      </p:sp>
+      <p:sp>
+        <p:nvSpPr>
+          <p:cNvPr id="3" name="Content Placeholder 2"/>
+          <p:cNvSpPr>
+            <a:spLocks noGrp="1"/>
+          </p:cNvSpPr>
+          <p:nvPr>
+            <p:ph idx="1"/>
+          </p:nvPr>
+        </p:nvSpPr>
+        <p:spPr>
+          <a:xfrm>
+            <a:off x="313267" y="1825625"/>
+            <a:ext cx="11040533" cy="4351338"/>
+          </a:xfrm>
+        </p:spPr>
+        <p:txBody>
+          <a:bodyPr>
+            <a:normAutofit/>
+          </a:bodyPr>
+          <a:lstStyle/>
+          <a:p>
+            <a:r>
+              <a:rPr lang="en-US" sz="3200" dirty="0" err="1"/>
+              <a:t>MicroServices</a:t>
+            </a:r>
+            <a:r>
+              <a:rPr lang="en-US" sz="3200" dirty="0"/>
+              <a:t> are extremely important and common in industry</a:t>
+            </a:r>
+          </a:p>
+          <a:p>
+            <a:r>
+              <a:rPr lang="en-US" sz="3200" dirty="0"/>
+              <a:t>Aimed at </a:t>
+            </a:r>
+            <a:r>
+              <a:rPr lang="en-US" sz="3200" i="1" dirty="0"/>
+              <a:t>large systems</a:t>
+            </a:r>
+            <a:r>
+              <a:rPr lang="en-US" sz="3200" dirty="0"/>
+              <a:t>, that need to be maintained for years</a:t>
+            </a:r>
+          </a:p>
+          <a:p>
+            <a:pPr lvl="1"/>
+            <a:r>
+              <a:rPr lang="en-US" sz="2800" dirty="0"/>
+              <a:t>think of Amazon, Netflix, Google, etc.</a:t>
+            </a:r>
+          </a:p>
+          <a:p>
+            <a:r>
+              <a:rPr lang="en-US" sz="3200" b="1" dirty="0"/>
+              <a:t>No Silver Bullet</a:t>
+            </a:r>
+          </a:p>
+          <a:p>
+            <a:pPr lvl="1"/>
+            <a:r>
+              <a:rPr lang="en-US" sz="2800" dirty="0"/>
+              <a:t>For small systems, monoliths are better</a:t>
+            </a:r>
+          </a:p>
+          <a:p>
+            <a:r>
+              <a:rPr lang="en-US" sz="3200" dirty="0"/>
+              <a:t>Challenge: understand the benefits of </a:t>
+            </a:r>
+            <a:r>
+              <a:rPr lang="en-US" sz="3200" dirty="0" err="1"/>
+              <a:t>microservices</a:t>
+            </a:r>
+            <a:r>
+              <a:rPr lang="en-US" sz="3200" dirty="0"/>
+              <a:t> when all your school projects are actually “tiny” (even your BSc project)</a:t>
+            </a:r>
+          </a:p>
+        </p:txBody>
+      </p:sp>
+    </p:spTree>
+    <p:extLst>
+      <p:ext uri="{BB962C8B-B14F-4D97-AF65-F5344CB8AC3E}">
+        <p14:creationId xmlns:p14="http://schemas.microsoft.com/office/powerpoint/2010/main" val="2750228027"/>
+      </p:ext>
+    </p:extLst>
+  </p:cSld>
+  <p:clrMapOvr>
+    <a:masterClrMapping/>
+  </p:clrMapOvr>
+</p:sld>
+</file>
+
+<file path=ppt/slides/slide63.xml><?xml version="1.0" encoding="utf-8"?>
+<p:sld xmlns:a="http://schemas.openxmlformats.org/drawingml/2006/main" xmlns:r="http://schemas.openxmlformats.org/officeDocument/2006/relationships" xmlns:p="http://schemas.openxmlformats.org/presentationml/2006/main">
+  <p:cSld>
+    <p:spTree>
+      <p:nvGrpSpPr>
+        <p:cNvPr id="1" name=""/>
+        <p:cNvGrpSpPr/>
+        <p:nvPr/>
+      </p:nvGrpSpPr>
+      <p:grpSpPr>
+        <a:xfrm>
+          <a:off x="0" y="0"/>
+          <a:ext cx="0" cy="0"/>
+          <a:chOff x="0" y="0"/>
+          <a:chExt cx="0" cy="0"/>
+        </a:xfrm>
+      </p:grpSpPr>
+      <p:sp>
+        <p:nvSpPr>
+          <p:cNvPr id="4" name="Title 3"/>
+          <p:cNvSpPr>
+            <a:spLocks noGrp="1"/>
+          </p:cNvSpPr>
+          <p:nvPr>
+            <p:ph type="title"/>
+          </p:nvPr>
+        </p:nvSpPr>
+        <p:spPr/>
+        <p:txBody>
+          <a:bodyPr/>
+          <a:lstStyle/>
+          <a:p>
+            <a:r>
+              <a:rPr lang="en-US" dirty="0" err="1"/>
+              <a:t>Git</a:t>
+            </a:r>
+            <a:r>
+              <a:rPr lang="en-US" dirty="0"/>
+              <a:t> Repository Modules</a:t>
+            </a:r>
+          </a:p>
+        </p:txBody>
+      </p:sp>
+      <p:sp>
+        <p:nvSpPr>
+          <p:cNvPr id="5" name="Content Placeholder 4"/>
+          <p:cNvSpPr>
+            <a:spLocks noGrp="1"/>
+          </p:cNvSpPr>
+          <p:nvPr>
+            <p:ph idx="1"/>
+          </p:nvPr>
+        </p:nvSpPr>
+        <p:spPr>
+          <a:xfrm>
+            <a:off x="296561" y="1825625"/>
+            <a:ext cx="11532973" cy="4972740"/>
+          </a:xfrm>
+        </p:spPr>
+        <p:txBody>
+          <a:bodyPr>
+            <a:normAutofit/>
+          </a:bodyPr>
+          <a:lstStyle/>
+          <a:p>
+            <a:r>
+              <a:rPr lang="en-US" i="1" dirty="0"/>
+              <a:t>NOTE: most of the explanations will be directly in the code as comments, and not here in the slides</a:t>
+            </a:r>
+            <a:endParaRPr lang="en-US" b="1" dirty="0"/>
+          </a:p>
+          <a:p>
+            <a:r>
+              <a:rPr lang="en-US" b="1" dirty="0"/>
+              <a:t>advanced/</a:t>
+            </a:r>
+            <a:r>
+              <a:rPr lang="en-US" b="1" dirty="0" err="1"/>
+              <a:t>microservice</a:t>
+            </a:r>
+            <a:r>
+              <a:rPr lang="en-US" b="1" dirty="0"/>
+              <a:t>/discovery/*</a:t>
+            </a:r>
+          </a:p>
+          <a:p>
+            <a:r>
+              <a:rPr lang="en-US" b="1" dirty="0"/>
+              <a:t>advanced/</a:t>
+            </a:r>
+            <a:r>
+              <a:rPr lang="en-US" b="1" dirty="0" err="1"/>
+              <a:t>microservice</a:t>
+            </a:r>
+            <a:r>
+              <a:rPr lang="en-US" b="1" dirty="0"/>
+              <a:t>/gateway/*</a:t>
+            </a:r>
+          </a:p>
+          <a:p>
+            <a:r>
+              <a:rPr lang="en-US" dirty="0"/>
+              <a:t>Study </a:t>
+            </a:r>
+            <a:r>
+              <a:rPr lang="en-US" i="1" dirty="0" err="1"/>
+              <a:t>Microservices</a:t>
+            </a:r>
+            <a:r>
+              <a:rPr lang="en-US" i="1" dirty="0"/>
+              <a:t> From Design to Deployment</a:t>
+            </a:r>
+            <a:r>
+              <a:rPr lang="en-US" dirty="0"/>
+              <a:t>.</a:t>
+            </a:r>
+          </a:p>
+          <a:p>
+            <a:pPr marL="0" indent="0">
+              <a:buNone/>
+            </a:pPr>
+            <a:endParaRPr lang="en-US" b="1" dirty="0"/>
+          </a:p>
+        </p:txBody>
+      </p:sp>
+    </p:spTree>
+    <p:extLst>
+      <p:ext uri="{BB962C8B-B14F-4D97-AF65-F5344CB8AC3E}">
+        <p14:creationId xmlns:p14="http://schemas.microsoft.com/office/powerpoint/2010/main" val="3684031900"/>
       </p:ext>
     </p:extLst>
   </p:cSld>

</xml_diff>